<commit_message>
##[0.1.0.7] - 2021-05-11 ### Ajout -Début de la mise en place de la pluie de flèches. ### Modification -Correction d'un bug qui ne préparait pas la fin de l'invincibilité lorsque le joueur réapparait. -Correction d'un bug de tag sur les tirs ennemis. ### Recherche
</commit_message>
<xml_diff>
--- a/Présentation/Projet Astral.pptx
+++ b/Présentation/Projet Astral.pptx
@@ -6,16 +6,16 @@
   </p:sldMasterIdLst>
   <p:sldIdLst>
     <p:sldId id="256" r:id="rId2"/>
-    <p:sldId id="257" r:id="rId3"/>
-    <p:sldId id="258" r:id="rId4"/>
+    <p:sldId id="258" r:id="rId3"/>
+    <p:sldId id="257" r:id="rId4"/>
     <p:sldId id="259" r:id="rId5"/>
     <p:sldId id="262" r:id="rId6"/>
     <p:sldId id="260" r:id="rId7"/>
     <p:sldId id="261" r:id="rId8"/>
     <p:sldId id="263" r:id="rId9"/>
     <p:sldId id="264" r:id="rId10"/>
-    <p:sldId id="265" r:id="rId11"/>
-    <p:sldId id="266" r:id="rId12"/>
+    <p:sldId id="266" r:id="rId11"/>
+    <p:sldId id="265" r:id="rId12"/>
     <p:sldId id="267" r:id="rId13"/>
     <p:sldId id="268" r:id="rId14"/>
   </p:sldIdLst>
@@ -1077,7 +1077,7 @@
         <a:p>
           <a:r>
             <a:rPr lang="fr-FR" dirty="0"/>
-            <a:t>Système de score.</a:t>
+            <a:t>Trajectoires et motifs.</a:t>
           </a:r>
           <a:endParaRPr lang="en-US" dirty="0"/>
         </a:p>
@@ -1095,43 +1095,6 @@
       </dgm:t>
     </dgm:pt>
     <dgm:pt modelId="{9E9A3D41-FB56-44C0-A39D-4EE6F029989A}" type="sibTrans" cxnId="{C18F3632-6869-4E13-871D-BC51EDB2C543}">
-      <dgm:prSet/>
-      <dgm:spPr/>
-      <dgm:t>
-        <a:bodyPr/>
-        <a:lstStyle/>
-        <a:p>
-          <a:endParaRPr lang="en-US"/>
-        </a:p>
-      </dgm:t>
-    </dgm:pt>
-    <dgm:pt modelId="{32AC6241-EBCE-44C1-A5A6-9480F5374887}">
-      <dgm:prSet/>
-      <dgm:spPr/>
-      <dgm:t>
-        <a:bodyPr/>
-        <a:lstStyle/>
-        <a:p>
-          <a:r>
-            <a:rPr lang="fr-FR" dirty="0"/>
-            <a:t>Trajectoires et motifs.</a:t>
-          </a:r>
-          <a:endParaRPr lang="en-US" dirty="0"/>
-        </a:p>
-      </dgm:t>
-    </dgm:pt>
-    <dgm:pt modelId="{E0D0D4B8-9487-4361-9CDE-7A63F13C37BC}" type="parTrans" cxnId="{E2CB28CE-58CB-4786-B0FA-3B4A4ED59B02}">
-      <dgm:prSet/>
-      <dgm:spPr/>
-      <dgm:t>
-        <a:bodyPr/>
-        <a:lstStyle/>
-        <a:p>
-          <a:endParaRPr lang="en-US"/>
-        </a:p>
-      </dgm:t>
-    </dgm:pt>
-    <dgm:pt modelId="{0EDB6F8B-FEB9-4C4C-9194-8E44620D0442}" type="sibTrans" cxnId="{E2CB28CE-58CB-4786-B0FA-3B4A4ED59B02}">
       <dgm:prSet/>
       <dgm:spPr/>
       <dgm:t>
@@ -1209,6 +1172,42 @@
       </dgm:t>
     </dgm:pt>
     <dgm:pt modelId="{56C9B353-C819-42CA-92C9-37ECB159E694}" type="sibTrans" cxnId="{2D633A81-07B0-4634-9F25-674E1B4FF291}">
+      <dgm:prSet/>
+      <dgm:spPr/>
+      <dgm:t>
+        <a:bodyPr/>
+        <a:lstStyle/>
+        <a:p>
+          <a:endParaRPr lang="fr-FR"/>
+        </a:p>
+      </dgm:t>
+    </dgm:pt>
+    <dgm:pt modelId="{16F5A21B-743F-4613-9876-4B0323B17CFB}">
+      <dgm:prSet/>
+      <dgm:spPr/>
+      <dgm:t>
+        <a:bodyPr/>
+        <a:lstStyle/>
+        <a:p>
+          <a:r>
+            <a:rPr lang="fr-FR"/>
+            <a:t>Système de score. </a:t>
+          </a:r>
+        </a:p>
+      </dgm:t>
+    </dgm:pt>
+    <dgm:pt modelId="{90D3BF83-AEFA-477D-8778-03CC0A85CDFF}" type="parTrans" cxnId="{C1CFEF14-3EA7-4855-8C8B-655B17F3AD5B}">
+      <dgm:prSet/>
+      <dgm:spPr/>
+      <dgm:t>
+        <a:bodyPr/>
+        <a:lstStyle/>
+        <a:p>
+          <a:endParaRPr lang="fr-FR"/>
+        </a:p>
+      </dgm:t>
+    </dgm:pt>
+    <dgm:pt modelId="{23384AFE-5976-4659-B068-6B744F750E90}" type="sibTrans" cxnId="{C1CFEF14-3EA7-4855-8C8B-655B17F3AD5B}">
       <dgm:prSet/>
       <dgm:spPr/>
       <dgm:t>
@@ -1306,8 +1305,8 @@
       <dgm:prSet presAssocID="{9E9A3D41-FB56-44C0-A39D-4EE6F029989A}" presName="spacer" presStyleCnt="0"/>
       <dgm:spPr/>
     </dgm:pt>
-    <dgm:pt modelId="{D788D77E-4B70-4547-8BEF-EBD7D3D82C05}" type="pres">
-      <dgm:prSet presAssocID="{32AC6241-EBCE-44C1-A5A6-9480F5374887}" presName="parentText" presStyleLbl="node1" presStyleIdx="6" presStyleCnt="8">
+    <dgm:pt modelId="{E28BD3D8-642F-4FD9-99C8-815E3798D1E8}" type="pres">
+      <dgm:prSet presAssocID="{16F5A21B-743F-4613-9876-4B0323B17CFB}" presName="parentText" presStyleLbl="node1" presStyleIdx="6" presStyleCnt="8">
         <dgm:presLayoutVars>
           <dgm:chMax val="0"/>
           <dgm:bulletEnabled val="1"/>
@@ -1315,8 +1314,8 @@
       </dgm:prSet>
       <dgm:spPr/>
     </dgm:pt>
-    <dgm:pt modelId="{7C16279A-058F-43D0-99EF-D8E10C4F61C6}" type="pres">
-      <dgm:prSet presAssocID="{0EDB6F8B-FEB9-4C4C-9194-8E44620D0442}" presName="spacer" presStyleCnt="0"/>
+    <dgm:pt modelId="{26ACDBD6-F2AD-4178-9559-563A5E5266A4}" type="pres">
+      <dgm:prSet presAssocID="{23384AFE-5976-4659-B068-6B744F750E90}" presName="spacer" presStyleCnt="0"/>
       <dgm:spPr/>
     </dgm:pt>
     <dgm:pt modelId="{98A94565-4B1C-4CCD-9ABE-201A2639AB13}" type="pres">
@@ -1331,12 +1330,12 @@
   </dgm:ptLst>
   <dgm:cxnLst>
     <dgm:cxn modelId="{FEBC8E07-48D8-4157-B628-A578F8716673}" type="presOf" srcId="{FE5C536C-CF0A-43D2-AF3C-A2B248CB6C8A}" destId="{C4743D76-6C0E-4C67-AF6F-7C5BAB9843CD}" srcOrd="0" destOrd="0" presId="urn:microsoft.com/office/officeart/2005/8/layout/vList2"/>
+    <dgm:cxn modelId="{C1CFEF14-3EA7-4855-8C8B-655B17F3AD5B}" srcId="{490992AE-D8C9-40AD-B42B-EE06D8CC6FF8}" destId="{16F5A21B-743F-4613-9876-4B0323B17CFB}" srcOrd="6" destOrd="0" parTransId="{90D3BF83-AEFA-477D-8778-03CC0A85CDFF}" sibTransId="{23384AFE-5976-4659-B068-6B744F750E90}"/>
     <dgm:cxn modelId="{F898AB2C-2475-46FF-AFBD-FD36D7E200A7}" srcId="{490992AE-D8C9-40AD-B42B-EE06D8CC6FF8}" destId="{291DB496-CF4B-4900-BA39-ED8816C265E3}" srcOrd="7" destOrd="0" parTransId="{DB6B8A74-EFA0-4E12-A647-F46DA980A2B5}" sibTransId="{6FB6D306-9EA9-42B8-91BE-635607051443}"/>
     <dgm:cxn modelId="{C18F3632-6869-4E13-871D-BC51EDB2C543}" srcId="{490992AE-D8C9-40AD-B42B-EE06D8CC6FF8}" destId="{40AA1F7A-4BB6-40E3-B006-2EF123822FA2}" srcOrd="5" destOrd="0" parTransId="{A47C6BE4-34E6-46E1-BEC2-B20ACF13BCAD}" sibTransId="{9E9A3D41-FB56-44C0-A39D-4EE6F029989A}"/>
     <dgm:cxn modelId="{EFFBB63E-D5AD-40C4-8B99-9454C7A3211C}" srcId="{490992AE-D8C9-40AD-B42B-EE06D8CC6FF8}" destId="{8CBFA04D-057E-4468-8465-913D8A7C5DD8}" srcOrd="4" destOrd="0" parTransId="{69807D64-1C4F-47BD-AC28-D122ACFA5FFC}" sibTransId="{D686BE64-A3FE-4111-B4A2-B08BC9A3ACEB}"/>
     <dgm:cxn modelId="{AAB9DD62-640B-4FDC-82C7-8CE428558D81}" type="presOf" srcId="{8CBFA04D-057E-4468-8465-913D8A7C5DD8}" destId="{BCA816F6-24BF-480B-9A34-FF1CFED12E9F}" srcOrd="0" destOrd="0" presId="urn:microsoft.com/office/officeart/2005/8/layout/vList2"/>
     <dgm:cxn modelId="{DE383967-716D-45D4-BAE0-72FEBCB0F044}" type="presOf" srcId="{291DB496-CF4B-4900-BA39-ED8816C265E3}" destId="{98A94565-4B1C-4CCD-9ABE-201A2639AB13}" srcOrd="0" destOrd="0" presId="urn:microsoft.com/office/officeart/2005/8/layout/vList2"/>
-    <dgm:cxn modelId="{7460A24D-E834-4B19-BB47-7769C3AB4EC3}" type="presOf" srcId="{32AC6241-EBCE-44C1-A5A6-9480F5374887}" destId="{D788D77E-4B70-4547-8BEF-EBD7D3D82C05}" srcOrd="0" destOrd="0" presId="urn:microsoft.com/office/officeart/2005/8/layout/vList2"/>
     <dgm:cxn modelId="{2EF21C56-BE95-4937-945F-F5EBADD87FBD}" type="presOf" srcId="{C801E396-BDD8-49C5-BF0E-515104B29F93}" destId="{C5E53257-D6EB-4C79-A3A0-A755F1D5E119}" srcOrd="0" destOrd="0" presId="urn:microsoft.com/office/officeart/2005/8/layout/vList2"/>
     <dgm:cxn modelId="{2D633A81-07B0-4634-9F25-674E1B4FF291}" srcId="{490992AE-D8C9-40AD-B42B-EE06D8CC6FF8}" destId="{BC43BD2C-6D0F-49A2-A407-ADD973E303BA}" srcOrd="0" destOrd="0" parTransId="{B4B9EB6D-A55B-4952-9355-B1213F00B16F}" sibTransId="{56C9B353-C819-42CA-92C9-37ECB159E694}"/>
     <dgm:cxn modelId="{E55F2587-BEAB-4024-B759-CD5947A155D5}" type="presOf" srcId="{490992AE-D8C9-40AD-B42B-EE06D8CC6FF8}" destId="{555C835A-FCB6-4DAB-B846-4C8A341EBE08}" srcOrd="0" destOrd="0" presId="urn:microsoft.com/office/officeart/2005/8/layout/vList2"/>
@@ -1345,7 +1344,7 @@
     <dgm:cxn modelId="{60C82AB9-7F06-40A3-A036-ECD3C5C56C70}" srcId="{490992AE-D8C9-40AD-B42B-EE06D8CC6FF8}" destId="{C801E396-BDD8-49C5-BF0E-515104B29F93}" srcOrd="3" destOrd="0" parTransId="{E5FA25A0-A682-4029-B89E-556FB40988F1}" sibTransId="{7EFD87BA-A5DB-4BFA-91FB-6F08501D52F8}"/>
     <dgm:cxn modelId="{38DD79B9-F7BF-4488-993A-77D95BBFFED7}" srcId="{490992AE-D8C9-40AD-B42B-EE06D8CC6FF8}" destId="{FE5C536C-CF0A-43D2-AF3C-A2B248CB6C8A}" srcOrd="2" destOrd="0" parTransId="{52890C30-23F4-4712-8570-CFCD8FF393D3}" sibTransId="{3D9E40F2-E408-4A4F-AFA4-DA26C0EF9AE4}"/>
     <dgm:cxn modelId="{8A12B9C4-07F3-40B6-A9C1-F8679813962D}" type="presOf" srcId="{BC43BD2C-6D0F-49A2-A407-ADD973E303BA}" destId="{E69DF95E-164A-4EF9-8B4B-E7E0962E9B54}" srcOrd="0" destOrd="0" presId="urn:microsoft.com/office/officeart/2005/8/layout/vList2"/>
-    <dgm:cxn modelId="{E2CB28CE-58CB-4786-B0FA-3B4A4ED59B02}" srcId="{490992AE-D8C9-40AD-B42B-EE06D8CC6FF8}" destId="{32AC6241-EBCE-44C1-A5A6-9480F5374887}" srcOrd="6" destOrd="0" parTransId="{E0D0D4B8-9487-4361-9CDE-7A63F13C37BC}" sibTransId="{0EDB6F8B-FEB9-4C4C-9194-8E44620D0442}"/>
+    <dgm:cxn modelId="{2F2D35C8-9DAD-4A0C-BCDE-81DA3732C192}" type="presOf" srcId="{16F5A21B-743F-4613-9876-4B0323B17CFB}" destId="{E28BD3D8-642F-4FD9-99C8-815E3798D1E8}" srcOrd="0" destOrd="0" presId="urn:microsoft.com/office/officeart/2005/8/layout/vList2"/>
     <dgm:cxn modelId="{3131F6DF-1E6A-448E-84FE-AC09986E2FAE}" type="presOf" srcId="{64A1A2B2-5800-4E73-BA40-099B4F94A503}" destId="{FDB77784-DF67-4126-A18F-7FA6C5BCDFEF}" srcOrd="0" destOrd="0" presId="urn:microsoft.com/office/officeart/2005/8/layout/vList2"/>
     <dgm:cxn modelId="{5B096BF6-3A2D-4A14-BA37-C7F11454C06F}" type="presParOf" srcId="{555C835A-FCB6-4DAB-B846-4C8A341EBE08}" destId="{E69DF95E-164A-4EF9-8B4B-E7E0962E9B54}" srcOrd="0" destOrd="0" presId="urn:microsoft.com/office/officeart/2005/8/layout/vList2"/>
     <dgm:cxn modelId="{606DCEDF-6456-45E7-AD3C-CA204C5039C2}" type="presParOf" srcId="{555C835A-FCB6-4DAB-B846-4C8A341EBE08}" destId="{A5CCC331-5AD8-4BB9-8777-0D85A06C852E}" srcOrd="1" destOrd="0" presId="urn:microsoft.com/office/officeart/2005/8/layout/vList2"/>
@@ -1359,8 +1358,8 @@
     <dgm:cxn modelId="{25370175-53B2-493A-8258-2D83D27A3C51}" type="presParOf" srcId="{555C835A-FCB6-4DAB-B846-4C8A341EBE08}" destId="{BD6533FC-2448-4E13-88E2-5EEC804D041B}" srcOrd="9" destOrd="0" presId="urn:microsoft.com/office/officeart/2005/8/layout/vList2"/>
     <dgm:cxn modelId="{3A3ED1CF-3825-4B83-9702-40CD697583DE}" type="presParOf" srcId="{555C835A-FCB6-4DAB-B846-4C8A341EBE08}" destId="{F5DDEC8B-C5CC-44D5-A9FF-2953BA5DE82D}" srcOrd="10" destOrd="0" presId="urn:microsoft.com/office/officeart/2005/8/layout/vList2"/>
     <dgm:cxn modelId="{EABCBD3D-A819-46AD-B40D-E27B20B08A9B}" type="presParOf" srcId="{555C835A-FCB6-4DAB-B846-4C8A341EBE08}" destId="{EC0650FC-24AF-437C-B4A9-8E3ADB567DC9}" srcOrd="11" destOrd="0" presId="urn:microsoft.com/office/officeart/2005/8/layout/vList2"/>
-    <dgm:cxn modelId="{1D61FC81-9D8A-4FF5-8307-7F9907FB5EB7}" type="presParOf" srcId="{555C835A-FCB6-4DAB-B846-4C8A341EBE08}" destId="{D788D77E-4B70-4547-8BEF-EBD7D3D82C05}" srcOrd="12" destOrd="0" presId="urn:microsoft.com/office/officeart/2005/8/layout/vList2"/>
-    <dgm:cxn modelId="{4D8854C8-5570-4B56-8347-E720F4A60FB5}" type="presParOf" srcId="{555C835A-FCB6-4DAB-B846-4C8A341EBE08}" destId="{7C16279A-058F-43D0-99EF-D8E10C4F61C6}" srcOrd="13" destOrd="0" presId="urn:microsoft.com/office/officeart/2005/8/layout/vList2"/>
+    <dgm:cxn modelId="{359DDD5C-F67A-4069-89F9-B4FE40F011A8}" type="presParOf" srcId="{555C835A-FCB6-4DAB-B846-4C8A341EBE08}" destId="{E28BD3D8-642F-4FD9-99C8-815E3798D1E8}" srcOrd="12" destOrd="0" presId="urn:microsoft.com/office/officeart/2005/8/layout/vList2"/>
+    <dgm:cxn modelId="{110B5964-A211-493F-80F0-F0AE06887784}" type="presParOf" srcId="{555C835A-FCB6-4DAB-B846-4C8A341EBE08}" destId="{26ACDBD6-F2AD-4178-9559-563A5E5266A4}" srcOrd="13" destOrd="0" presId="urn:microsoft.com/office/officeart/2005/8/layout/vList2"/>
     <dgm:cxn modelId="{8CBDCA72-F202-4F8B-A8EE-5D92792F1E46}" type="presParOf" srcId="{555C835A-FCB6-4DAB-B846-4C8A341EBE08}" destId="{98A94565-4B1C-4CCD-9ABE-201A2639AB13}" srcOrd="14" destOrd="0" presId="urn:microsoft.com/office/officeart/2005/8/layout/vList2"/>
   </dgm:cxnLst>
   <dgm:bg/>
@@ -1848,7 +1847,7 @@
           </a:pPr>
           <a:r>
             <a:rPr lang="fr-FR" sz="2600" kern="1200" dirty="0"/>
-            <a:t>Système de score.</a:t>
+            <a:t>Trajectoires et motifs.</a:t>
           </a:r>
           <a:endParaRPr lang="en-US" sz="2600" kern="1200" dirty="0"/>
         </a:p>
@@ -1858,7 +1857,7 @@
         <a:ext cx="6839628" cy="562726"/>
       </dsp:txXfrm>
     </dsp:sp>
-    <dsp:sp modelId="{D788D77E-4B70-4547-8BEF-EBD7D3D82C05}">
+    <dsp:sp modelId="{E28BD3D8-642F-4FD9-99C8-815E3798D1E8}">
       <dsp:nvSpPr>
         <dsp:cNvPr id="0" name=""/>
         <dsp:cNvSpPr/>
@@ -1926,10 +1925,9 @@
             <a:buNone/>
           </a:pPr>
           <a:r>
-            <a:rPr lang="fr-FR" sz="2600" kern="1200" dirty="0"/>
-            <a:t>Trajectoires et motifs.</a:t>
+            <a:rPr lang="fr-FR" sz="2600" kern="1200"/>
+            <a:t>Système de score. </a:t>
           </a:r>
-          <a:endParaRPr lang="en-US" sz="2600" kern="1200" dirty="0"/>
         </a:p>
       </dsp:txBody>
       <dsp:txXfrm>
@@ -3765,7 +3763,7 @@
           <a:p>
             <a:fld id="{72345051-2045-45DA-935E-2E3CA1A69ADC}" type="datetimeFigureOut">
               <a:rPr lang="en-US" smtClean="0"/>
-              <a:t>5/10/2021</a:t>
+              <a:t>5/11/2021</a:t>
             </a:fld>
             <a:endParaRPr lang="en-US" dirty="0"/>
           </a:p>
@@ -3963,7 +3961,7 @@
           <a:p>
             <a:fld id="{72345051-2045-45DA-935E-2E3CA1A69ADC}" type="datetimeFigureOut">
               <a:rPr lang="en-US" smtClean="0"/>
-              <a:t>5/10/2021</a:t>
+              <a:t>5/11/2021</a:t>
             </a:fld>
             <a:endParaRPr lang="en-US"/>
           </a:p>
@@ -4171,7 +4169,7 @@
           <a:p>
             <a:fld id="{72345051-2045-45DA-935E-2E3CA1A69ADC}" type="datetimeFigureOut">
               <a:rPr lang="en-US" smtClean="0"/>
-              <a:t>5/10/2021</a:t>
+              <a:t>5/11/2021</a:t>
             </a:fld>
             <a:endParaRPr lang="en-US"/>
           </a:p>
@@ -4393,7 +4391,7 @@
           <a:p>
             <a:fld id="{72345051-2045-45DA-935E-2E3CA1A69ADC}" type="datetimeFigureOut">
               <a:rPr lang="en-US" smtClean="0"/>
-              <a:t>5/10/2021</a:t>
+              <a:t>5/11/2021</a:t>
             </a:fld>
             <a:endParaRPr lang="en-US"/>
           </a:p>
@@ -5304,7 +5302,7 @@
           <a:p>
             <a:fld id="{72345051-2045-45DA-935E-2E3CA1A69ADC}" type="datetimeFigureOut">
               <a:rPr lang="en-US" smtClean="0"/>
-              <a:t>5/10/2021</a:t>
+              <a:t>5/11/2021</a:t>
             </a:fld>
             <a:endParaRPr lang="en-US"/>
           </a:p>
@@ -5907,7 +5905,7 @@
           <a:p>
             <a:fld id="{72345051-2045-45DA-935E-2E3CA1A69ADC}" type="datetimeFigureOut">
               <a:rPr lang="en-US" smtClean="0"/>
-              <a:t>5/10/2021</a:t>
+              <a:t>5/11/2021</a:t>
             </a:fld>
             <a:endParaRPr lang="en-US"/>
           </a:p>
@@ -6955,7 +6953,7 @@
           <a:p>
             <a:fld id="{72345051-2045-45DA-935E-2E3CA1A69ADC}" type="datetimeFigureOut">
               <a:rPr lang="en-US" smtClean="0"/>
-              <a:t>5/10/2021</a:t>
+              <a:t>5/11/2021</a:t>
             </a:fld>
             <a:endParaRPr lang="en-US"/>
           </a:p>
@@ -7739,7 +7737,7 @@
           <a:p>
             <a:fld id="{72345051-2045-45DA-935E-2E3CA1A69ADC}" type="datetimeFigureOut">
               <a:rPr lang="en-US" smtClean="0"/>
-              <a:t>5/10/2021</a:t>
+              <a:t>5/11/2021</a:t>
             </a:fld>
             <a:endParaRPr lang="en-US"/>
           </a:p>
@@ -8188,7 +8186,7 @@
           <a:p>
             <a:fld id="{72345051-2045-45DA-935E-2E3CA1A69ADC}" type="datetimeFigureOut">
               <a:rPr lang="en-US" smtClean="0"/>
-              <a:t>5/10/2021</a:t>
+              <a:t>5/11/2021</a:t>
             </a:fld>
             <a:endParaRPr lang="en-US"/>
           </a:p>
@@ -8505,7 +8503,7 @@
           <a:p>
             <a:fld id="{72345051-2045-45DA-935E-2E3CA1A69ADC}" type="datetimeFigureOut">
               <a:rPr lang="en-US" smtClean="0"/>
-              <a:t>5/10/2021</a:t>
+              <a:t>5/11/2021</a:t>
             </a:fld>
             <a:endParaRPr lang="en-US"/>
           </a:p>
@@ -9133,7 +9131,7 @@
           <a:p>
             <a:fld id="{72345051-2045-45DA-935E-2E3CA1A69ADC}" type="datetimeFigureOut">
               <a:rPr lang="en-US" smtClean="0"/>
-              <a:t>5/10/2021</a:t>
+              <a:t>5/11/2021</a:t>
             </a:fld>
             <a:endParaRPr lang="en-US"/>
           </a:p>
@@ -9706,7 +9704,7 @@
           <a:p>
             <a:fld id="{72345051-2045-45DA-935E-2E3CA1A69ADC}" type="datetimeFigureOut">
               <a:rPr lang="en-US" smtClean="0"/>
-              <a:t>5/10/2021</a:t>
+              <a:t>5/11/2021</a:t>
             </a:fld>
             <a:endParaRPr lang="en-US" dirty="0"/>
           </a:p>
@@ -10253,7 +10251,7 @@
             <a:pPr algn="ctr"/>
             <a:r>
               <a:rPr lang="fr-FR" dirty="0"/>
-              <a:t>Projet Astral</a:t>
+              <a:t>Astral</a:t>
             </a:r>
             <a:br>
               <a:rPr lang="fr-FR" dirty="0"/>
@@ -11217,6 +11215,688 @@
 </file>
 
 <file path=ppt/slides/slide10.xml><?xml version="1.0" encoding="utf-8"?>
+<p:sld xmlns:a="http://schemas.openxmlformats.org/drawingml/2006/main" xmlns:r="http://schemas.openxmlformats.org/officeDocument/2006/relationships" xmlns:p="http://schemas.openxmlformats.org/presentationml/2006/main">
+  <p:cSld>
+    <p:bg>
+      <p:bgPr>
+        <a:solidFill>
+          <a:schemeClr val="bg1"/>
+        </a:solidFill>
+        <a:effectLst/>
+      </p:bgPr>
+    </p:bg>
+    <p:spTree>
+      <p:nvGrpSpPr>
+        <p:cNvPr id="1" name=""/>
+        <p:cNvGrpSpPr/>
+        <p:nvPr/>
+      </p:nvGrpSpPr>
+      <p:grpSpPr>
+        <a:xfrm>
+          <a:off x="0" y="0"/>
+          <a:ext cx="0" cy="0"/>
+          <a:chOff x="0" y="0"/>
+          <a:chExt cx="0" cy="0"/>
+        </a:xfrm>
+      </p:grpSpPr>
+      <p:sp useBgFill="1">
+        <p:nvSpPr>
+          <p:cNvPr id="16" name="Rectangle 11">
+            <a:extLst>
+              <a:ext uri="{FF2B5EF4-FFF2-40B4-BE49-F238E27FC236}">
+                <a16:creationId xmlns:a16="http://schemas.microsoft.com/office/drawing/2014/main" id="{2C61293E-6EBE-43EF-A52C-9BEBFD7679D4}"/>
+              </a:ext>
+              <a:ext uri="{C183D7F6-B498-43B3-948B-1728B52AA6E4}">
+                <adec:decorative xmlns:adec="http://schemas.microsoft.com/office/drawing/2017/decorative" val="1"/>
+              </a:ext>
+            </a:extLst>
+          </p:cNvPr>
+          <p:cNvSpPr>
+            <a:spLocks noGrp="1" noRot="1" noChangeAspect="1" noMove="1" noResize="1" noEditPoints="1" noAdjustHandles="1" noChangeArrowheads="1" noChangeShapeType="1" noTextEdit="1"/>
+          </p:cNvSpPr>
+          <p:nvPr>
+            <p:extLst>
+              <p:ext uri="{386F3935-93C4-4BCD-93E2-E3B085C9AB24}">
+                <p16:designElem xmlns:p16="http://schemas.microsoft.com/office/powerpoint/2015/main" val="1"/>
+              </p:ext>
+            </p:extLst>
+          </p:nvPr>
+        </p:nvSpPr>
+        <p:spPr>
+          <a:xfrm>
+            <a:off x="0" y="0"/>
+            <a:ext cx="12188952" cy="6858000"/>
+          </a:xfrm>
+          <a:prstGeom prst="rect">
+            <a:avLst/>
+          </a:prstGeom>
+          <a:ln>
+            <a:noFill/>
+          </a:ln>
+        </p:spPr>
+        <p:style>
+          <a:lnRef idx="2">
+            <a:schemeClr val="accent1">
+              <a:shade val="50000"/>
+            </a:schemeClr>
+          </a:lnRef>
+          <a:fillRef idx="1">
+            <a:schemeClr val="accent1"/>
+          </a:fillRef>
+          <a:effectRef idx="0">
+            <a:schemeClr val="accent1"/>
+          </a:effectRef>
+          <a:fontRef idx="minor">
+            <a:schemeClr val="lt1"/>
+          </a:fontRef>
+        </p:style>
+        <p:txBody>
+          <a:bodyPr rtlCol="0" anchor="ctr"/>
+          <a:lstStyle/>
+          <a:p>
+            <a:pPr algn="ctr"/>
+            <a:endParaRPr lang="en-US"/>
+          </a:p>
+        </p:txBody>
+      </p:sp>
+      <p:sp>
+        <p:nvSpPr>
+          <p:cNvPr id="2" name="Titre 1">
+            <a:extLst>
+              <a:ext uri="{FF2B5EF4-FFF2-40B4-BE49-F238E27FC236}">
+                <a16:creationId xmlns:a16="http://schemas.microsoft.com/office/drawing/2014/main" id="{C02C3E2E-BE11-4D2A-812A-455C9CED5E54}"/>
+              </a:ext>
+            </a:extLst>
+          </p:cNvPr>
+          <p:cNvSpPr>
+            <a:spLocks noGrp="1"/>
+          </p:cNvSpPr>
+          <p:nvPr>
+            <p:ph type="title"/>
+          </p:nvPr>
+        </p:nvSpPr>
+        <p:spPr>
+          <a:xfrm>
+            <a:off x="5297762" y="329184"/>
+            <a:ext cx="6251110" cy="1783080"/>
+          </a:xfrm>
+        </p:spPr>
+        <p:txBody>
+          <a:bodyPr anchor="b">
+            <a:normAutofit/>
+          </a:bodyPr>
+          <a:lstStyle/>
+          <a:p>
+            <a:r>
+              <a:rPr lang="fr-FR" sz="7200"/>
+              <a:t>Trajectoires et motifs</a:t>
+            </a:r>
+          </a:p>
+        </p:txBody>
+      </p:sp>
+      <p:sp>
+        <p:nvSpPr>
+          <p:cNvPr id="17" name="Rectangle 6">
+            <a:extLst>
+              <a:ext uri="{FF2B5EF4-FFF2-40B4-BE49-F238E27FC236}">
+                <a16:creationId xmlns:a16="http://schemas.microsoft.com/office/drawing/2014/main" id="{3FCFB1DE-0B7E-48CC-BA90-B2AB0889F9D6}"/>
+              </a:ext>
+              <a:ext uri="{C183D7F6-B498-43B3-948B-1728B52AA6E4}">
+                <adec:decorative xmlns:adec="http://schemas.microsoft.com/office/drawing/2017/decorative" val="1"/>
+              </a:ext>
+            </a:extLst>
+          </p:cNvPr>
+          <p:cNvSpPr>
+            <a:spLocks noGrp="1" noRot="1" noChangeAspect="1" noMove="1" noResize="1" noEditPoints="1" noAdjustHandles="1" noChangeArrowheads="1" noChangeShapeType="1" noTextEdit="1"/>
+          </p:cNvSpPr>
+          <p:nvPr>
+            <p:extLst>
+              <p:ext uri="{386F3935-93C4-4BCD-93E2-E3B085C9AB24}">
+                <p16:designElem xmlns:p16="http://schemas.microsoft.com/office/powerpoint/2015/main" val="1"/>
+              </p:ext>
+            </p:extLst>
+          </p:nvPr>
+        </p:nvSpPr>
+        <p:spPr>
+          <a:xfrm>
+            <a:off x="5412862" y="2395728"/>
+            <a:ext cx="4243589" cy="27432"/>
+          </a:xfrm>
+          <a:custGeom>
+            <a:avLst/>
+            <a:gdLst>
+              <a:gd name="connsiteX0" fmla="*/ 0 w 4243589"/>
+              <a:gd name="connsiteY0" fmla="*/ 0 h 27432"/>
+              <a:gd name="connsiteX1" fmla="*/ 563791 w 4243589"/>
+              <a:gd name="connsiteY1" fmla="*/ 0 h 27432"/>
+              <a:gd name="connsiteX2" fmla="*/ 1042710 w 4243589"/>
+              <a:gd name="connsiteY2" fmla="*/ 0 h 27432"/>
+              <a:gd name="connsiteX3" fmla="*/ 1564066 w 4243589"/>
+              <a:gd name="connsiteY3" fmla="*/ 0 h 27432"/>
+              <a:gd name="connsiteX4" fmla="*/ 2212729 w 4243589"/>
+              <a:gd name="connsiteY4" fmla="*/ 0 h 27432"/>
+              <a:gd name="connsiteX5" fmla="*/ 2776520 w 4243589"/>
+              <a:gd name="connsiteY5" fmla="*/ 0 h 27432"/>
+              <a:gd name="connsiteX6" fmla="*/ 3297875 w 4243589"/>
+              <a:gd name="connsiteY6" fmla="*/ 0 h 27432"/>
+              <a:gd name="connsiteX7" fmla="*/ 4243589 w 4243589"/>
+              <a:gd name="connsiteY7" fmla="*/ 0 h 27432"/>
+              <a:gd name="connsiteX8" fmla="*/ 4243589 w 4243589"/>
+              <a:gd name="connsiteY8" fmla="*/ 27432 h 27432"/>
+              <a:gd name="connsiteX9" fmla="*/ 3637362 w 4243589"/>
+              <a:gd name="connsiteY9" fmla="*/ 27432 h 27432"/>
+              <a:gd name="connsiteX10" fmla="*/ 3116007 w 4243589"/>
+              <a:gd name="connsiteY10" fmla="*/ 27432 h 27432"/>
+              <a:gd name="connsiteX11" fmla="*/ 2424908 w 4243589"/>
+              <a:gd name="connsiteY11" fmla="*/ 27432 h 27432"/>
+              <a:gd name="connsiteX12" fmla="*/ 1861117 w 4243589"/>
+              <a:gd name="connsiteY12" fmla="*/ 27432 h 27432"/>
+              <a:gd name="connsiteX13" fmla="*/ 1382198 w 4243589"/>
+              <a:gd name="connsiteY13" fmla="*/ 27432 h 27432"/>
+              <a:gd name="connsiteX14" fmla="*/ 733535 w 4243589"/>
+              <a:gd name="connsiteY14" fmla="*/ 27432 h 27432"/>
+              <a:gd name="connsiteX15" fmla="*/ 0 w 4243589"/>
+              <a:gd name="connsiteY15" fmla="*/ 27432 h 27432"/>
+              <a:gd name="connsiteX16" fmla="*/ 0 w 4243589"/>
+              <a:gd name="connsiteY16" fmla="*/ 0 h 27432"/>
+            </a:gdLst>
+            <a:ahLst/>
+            <a:cxnLst>
+              <a:cxn ang="0">
+                <a:pos x="connsiteX0" y="connsiteY0"/>
+              </a:cxn>
+              <a:cxn ang="0">
+                <a:pos x="connsiteX1" y="connsiteY1"/>
+              </a:cxn>
+              <a:cxn ang="0">
+                <a:pos x="connsiteX2" y="connsiteY2"/>
+              </a:cxn>
+              <a:cxn ang="0">
+                <a:pos x="connsiteX3" y="connsiteY3"/>
+              </a:cxn>
+              <a:cxn ang="0">
+                <a:pos x="connsiteX4" y="connsiteY4"/>
+              </a:cxn>
+              <a:cxn ang="0">
+                <a:pos x="connsiteX5" y="connsiteY5"/>
+              </a:cxn>
+              <a:cxn ang="0">
+                <a:pos x="connsiteX6" y="connsiteY6"/>
+              </a:cxn>
+              <a:cxn ang="0">
+                <a:pos x="connsiteX7" y="connsiteY7"/>
+              </a:cxn>
+              <a:cxn ang="0">
+                <a:pos x="connsiteX8" y="connsiteY8"/>
+              </a:cxn>
+              <a:cxn ang="0">
+                <a:pos x="connsiteX9" y="connsiteY9"/>
+              </a:cxn>
+              <a:cxn ang="0">
+                <a:pos x="connsiteX10" y="connsiteY10"/>
+              </a:cxn>
+              <a:cxn ang="0">
+                <a:pos x="connsiteX11" y="connsiteY11"/>
+              </a:cxn>
+              <a:cxn ang="0">
+                <a:pos x="connsiteX12" y="connsiteY12"/>
+              </a:cxn>
+              <a:cxn ang="0">
+                <a:pos x="connsiteX13" y="connsiteY13"/>
+              </a:cxn>
+              <a:cxn ang="0">
+                <a:pos x="connsiteX14" y="connsiteY14"/>
+              </a:cxn>
+              <a:cxn ang="0">
+                <a:pos x="connsiteX15" y="connsiteY15"/>
+              </a:cxn>
+              <a:cxn ang="0">
+                <a:pos x="connsiteX16" y="connsiteY16"/>
+              </a:cxn>
+            </a:cxnLst>
+            <a:rect l="l" t="t" r="r" b="b"/>
+            <a:pathLst>
+              <a:path w="4243589" h="27432" fill="none" extrusionOk="0">
+                <a:moveTo>
+                  <a:pt x="0" y="0"/>
+                </a:moveTo>
+                <a:cubicBezTo>
+                  <a:pt x="157351" y="-15653"/>
+                  <a:pt x="378877" y="-5828"/>
+                  <a:pt x="563791" y="0"/>
+                </a:cubicBezTo>
+                <a:cubicBezTo>
+                  <a:pt x="748705" y="5828"/>
+                  <a:pt x="905659" y="-5525"/>
+                  <a:pt x="1042710" y="0"/>
+                </a:cubicBezTo>
+                <a:cubicBezTo>
+                  <a:pt x="1179761" y="5525"/>
+                  <a:pt x="1356845" y="-21288"/>
+                  <a:pt x="1564066" y="0"/>
+                </a:cubicBezTo>
+                <a:cubicBezTo>
+                  <a:pt x="1771287" y="21288"/>
+                  <a:pt x="1912099" y="25135"/>
+                  <a:pt x="2212729" y="0"/>
+                </a:cubicBezTo>
+                <a:cubicBezTo>
+                  <a:pt x="2513359" y="-25135"/>
+                  <a:pt x="2514918" y="-27119"/>
+                  <a:pt x="2776520" y="0"/>
+                </a:cubicBezTo>
+                <a:cubicBezTo>
+                  <a:pt x="3038122" y="27119"/>
+                  <a:pt x="3178771" y="18116"/>
+                  <a:pt x="3297875" y="0"/>
+                </a:cubicBezTo>
+                <a:cubicBezTo>
+                  <a:pt x="3416980" y="-18116"/>
+                  <a:pt x="4012240" y="-40869"/>
+                  <a:pt x="4243589" y="0"/>
+                </a:cubicBezTo>
+                <a:cubicBezTo>
+                  <a:pt x="4242616" y="8304"/>
+                  <a:pt x="4243111" y="21512"/>
+                  <a:pt x="4243589" y="27432"/>
+                </a:cubicBezTo>
+                <a:cubicBezTo>
+                  <a:pt x="4112949" y="6289"/>
+                  <a:pt x="3928037" y="10975"/>
+                  <a:pt x="3637362" y="27432"/>
+                </a:cubicBezTo>
+                <a:cubicBezTo>
+                  <a:pt x="3346687" y="43889"/>
+                  <a:pt x="3254446" y="35813"/>
+                  <a:pt x="3116007" y="27432"/>
+                </a:cubicBezTo>
+                <a:cubicBezTo>
+                  <a:pt x="2977569" y="19051"/>
+                  <a:pt x="2620228" y="38017"/>
+                  <a:pt x="2424908" y="27432"/>
+                </a:cubicBezTo>
+                <a:cubicBezTo>
+                  <a:pt x="2229588" y="16847"/>
+                  <a:pt x="2088287" y="5290"/>
+                  <a:pt x="1861117" y="27432"/>
+                </a:cubicBezTo>
+                <a:cubicBezTo>
+                  <a:pt x="1633947" y="49574"/>
+                  <a:pt x="1502447" y="8273"/>
+                  <a:pt x="1382198" y="27432"/>
+                </a:cubicBezTo>
+                <a:cubicBezTo>
+                  <a:pt x="1261949" y="46591"/>
+                  <a:pt x="1045440" y="37497"/>
+                  <a:pt x="733535" y="27432"/>
+                </a:cubicBezTo>
+                <a:cubicBezTo>
+                  <a:pt x="421630" y="17367"/>
+                  <a:pt x="341257" y="-9215"/>
+                  <a:pt x="0" y="27432"/>
+                </a:cubicBezTo>
+                <a:cubicBezTo>
+                  <a:pt x="-1048" y="14992"/>
+                  <a:pt x="-1120" y="7447"/>
+                  <a:pt x="0" y="0"/>
+                </a:cubicBezTo>
+                <a:close/>
+              </a:path>
+              <a:path w="4243589" h="27432" stroke="0" extrusionOk="0">
+                <a:moveTo>
+                  <a:pt x="0" y="0"/>
+                </a:moveTo>
+                <a:cubicBezTo>
+                  <a:pt x="128164" y="17204"/>
+                  <a:pt x="312653" y="1129"/>
+                  <a:pt x="563791" y="0"/>
+                </a:cubicBezTo>
+                <a:cubicBezTo>
+                  <a:pt x="814929" y="-1129"/>
+                  <a:pt x="837271" y="8503"/>
+                  <a:pt x="1042710" y="0"/>
+                </a:cubicBezTo>
+                <a:cubicBezTo>
+                  <a:pt x="1248149" y="-8503"/>
+                  <a:pt x="1588432" y="-28862"/>
+                  <a:pt x="1733809" y="0"/>
+                </a:cubicBezTo>
+                <a:cubicBezTo>
+                  <a:pt x="1879186" y="28862"/>
+                  <a:pt x="2052815" y="5974"/>
+                  <a:pt x="2297600" y="0"/>
+                </a:cubicBezTo>
+                <a:cubicBezTo>
+                  <a:pt x="2542385" y="-5974"/>
+                  <a:pt x="2699960" y="-23550"/>
+                  <a:pt x="2861391" y="0"/>
+                </a:cubicBezTo>
+                <a:cubicBezTo>
+                  <a:pt x="3022822" y="23550"/>
+                  <a:pt x="3390411" y="25272"/>
+                  <a:pt x="3552490" y="0"/>
+                </a:cubicBezTo>
+                <a:cubicBezTo>
+                  <a:pt x="3714569" y="-25272"/>
+                  <a:pt x="3950585" y="-31327"/>
+                  <a:pt x="4243589" y="0"/>
+                </a:cubicBezTo>
+                <a:cubicBezTo>
+                  <a:pt x="4244074" y="9333"/>
+                  <a:pt x="4244867" y="19699"/>
+                  <a:pt x="4243589" y="27432"/>
+                </a:cubicBezTo>
+                <a:cubicBezTo>
+                  <a:pt x="4130424" y="7904"/>
+                  <a:pt x="3932803" y="51393"/>
+                  <a:pt x="3722234" y="27432"/>
+                </a:cubicBezTo>
+                <a:cubicBezTo>
+                  <a:pt x="3511665" y="3471"/>
+                  <a:pt x="3269903" y="55138"/>
+                  <a:pt x="3116007" y="27432"/>
+                </a:cubicBezTo>
+                <a:cubicBezTo>
+                  <a:pt x="2962111" y="-274"/>
+                  <a:pt x="2744280" y="32368"/>
+                  <a:pt x="2509780" y="27432"/>
+                </a:cubicBezTo>
+                <a:cubicBezTo>
+                  <a:pt x="2275280" y="22496"/>
+                  <a:pt x="2066059" y="52808"/>
+                  <a:pt x="1945989" y="27432"/>
+                </a:cubicBezTo>
+                <a:cubicBezTo>
+                  <a:pt x="1825919" y="2056"/>
+                  <a:pt x="1407329" y="21760"/>
+                  <a:pt x="1254890" y="27432"/>
+                </a:cubicBezTo>
+                <a:cubicBezTo>
+                  <a:pt x="1102451" y="33104"/>
+                  <a:pt x="837950" y="40817"/>
+                  <a:pt x="563791" y="27432"/>
+                </a:cubicBezTo>
+                <a:cubicBezTo>
+                  <a:pt x="289632" y="14047"/>
+                  <a:pt x="132768" y="16249"/>
+                  <a:pt x="0" y="27432"/>
+                </a:cubicBezTo>
+                <a:cubicBezTo>
+                  <a:pt x="211" y="18145"/>
+                  <a:pt x="120" y="6480"/>
+                  <a:pt x="0" y="0"/>
+                </a:cubicBezTo>
+                <a:close/>
+              </a:path>
+            </a:pathLst>
+          </a:custGeom>
+          <a:solidFill>
+            <a:srgbClr val="D55D3B"/>
+          </a:solidFill>
+          <a:ln w="38100" cap="rnd">
+            <a:solidFill>
+              <a:srgbClr val="D55D3B"/>
+            </a:solidFill>
+            <a:round/>
+            <a:extLst>
+              <a:ext uri="{C807C97D-BFC1-408E-A445-0C87EB9F89A2}">
+                <ask:lineSketchStyleProps xmlns:ask="http://schemas.microsoft.com/office/drawing/2018/sketchyshapes" sd="1219033472">
+                  <a:prstGeom prst="rect">
+                    <a:avLst/>
+                  </a:prstGeom>
+                  <ask:type>
+                    <ask:lineSketchFreehand/>
+                  </ask:type>
+                </ask:lineSketchStyleProps>
+              </a:ext>
+            </a:extLst>
+          </a:ln>
+        </p:spPr>
+        <p:style>
+          <a:lnRef idx="2">
+            <a:schemeClr val="accent1">
+              <a:shade val="50000"/>
+            </a:schemeClr>
+          </a:lnRef>
+          <a:fillRef idx="1">
+            <a:schemeClr val="accent1"/>
+          </a:fillRef>
+          <a:effectRef idx="0">
+            <a:schemeClr val="accent1"/>
+          </a:effectRef>
+          <a:fontRef idx="minor">
+            <a:schemeClr val="lt1"/>
+          </a:fontRef>
+        </p:style>
+        <p:txBody>
+          <a:bodyPr rtlCol="0" anchor="ctr"/>
+          <a:lstStyle/>
+          <a:p>
+            <a:pPr algn="ctr"/>
+            <a:endParaRPr lang="en-US"/>
+          </a:p>
+        </p:txBody>
+      </p:sp>
+      <p:sp>
+        <p:nvSpPr>
+          <p:cNvPr id="3" name="Espace réservé du contenu 2">
+            <a:extLst>
+              <a:ext uri="{FF2B5EF4-FFF2-40B4-BE49-F238E27FC236}">
+                <a16:creationId xmlns:a16="http://schemas.microsoft.com/office/drawing/2014/main" id="{AF59C72B-C8A8-4636-BB41-41C40D98FC12}"/>
+              </a:ext>
+            </a:extLst>
+          </p:cNvPr>
+          <p:cNvSpPr>
+            <a:spLocks noGrp="1"/>
+          </p:cNvSpPr>
+          <p:nvPr>
+            <p:ph idx="1"/>
+          </p:nvPr>
+        </p:nvSpPr>
+        <p:spPr>
+          <a:xfrm>
+            <a:off x="5297762" y="2706624"/>
+            <a:ext cx="6251110" cy="3483864"/>
+          </a:xfrm>
+        </p:spPr>
+        <p:txBody>
+          <a:bodyPr>
+            <a:noAutofit/>
+          </a:bodyPr>
+          <a:lstStyle/>
+          <a:p>
+            <a:r>
+              <a:rPr lang="fr-FR" sz="3600" dirty="0"/>
+              <a:t>Courbes mathématiques</a:t>
+            </a:r>
+          </a:p>
+          <a:p>
+            <a:r>
+              <a:rPr lang="fr-FR" sz="3600" dirty="0"/>
+              <a:t>Trajectoires relatives à un mobile</a:t>
+            </a:r>
+          </a:p>
+          <a:p>
+            <a:r>
+              <a:rPr lang="fr-FR" sz="3600" dirty="0"/>
+              <a:t>Chemins</a:t>
+            </a:r>
+          </a:p>
+          <a:p>
+            <a:r>
+              <a:rPr lang="fr-FR" sz="3600" dirty="0"/>
+              <a:t>Mise en place en fonction du temps</a:t>
+            </a:r>
+          </a:p>
+          <a:p>
+            <a:r>
+              <a:rPr lang="fr-FR" sz="3600" dirty="0"/>
+              <a:t>Cumul des différents types</a:t>
+            </a:r>
+          </a:p>
+        </p:txBody>
+      </p:sp>
+      <p:pic>
+        <p:nvPicPr>
+          <p:cNvPr id="7" name="Image 6">
+            <a:extLst>
+              <a:ext uri="{FF2B5EF4-FFF2-40B4-BE49-F238E27FC236}">
+                <a16:creationId xmlns:a16="http://schemas.microsoft.com/office/drawing/2014/main" id="{980B4CEF-ACB5-46D6-A57D-C6A4D05C13EA}"/>
+              </a:ext>
+            </a:extLst>
+          </p:cNvPr>
+          <p:cNvPicPr>
+            <a:picLocks noChangeAspect="1"/>
+          </p:cNvPicPr>
+          <p:nvPr/>
+        </p:nvPicPr>
+        <p:blipFill rotWithShape="1">
+          <a:blip r:embed="rId2">
+            <a:extLst>
+              <a:ext uri="{28A0092B-C50C-407E-A947-70E740481C1C}">
+                <a14:useLocalDpi xmlns:a14="http://schemas.microsoft.com/office/drawing/2010/main" val="0"/>
+              </a:ext>
+            </a:extLst>
+          </a:blip>
+          <a:srcRect l="18939" r="12923"/>
+          <a:stretch/>
+        </p:blipFill>
+        <p:spPr>
+          <a:xfrm>
+            <a:off x="1" y="10"/>
+            <a:ext cx="4657344" cy="6857990"/>
+          </a:xfrm>
+          <a:custGeom>
+            <a:avLst/>
+            <a:gdLst/>
+            <a:ahLst/>
+            <a:cxnLst/>
+            <a:rect l="l" t="t" r="r" b="b"/>
+            <a:pathLst>
+              <a:path w="4657344" h="6858000">
+                <a:moveTo>
+                  <a:pt x="0" y="0"/>
+                </a:moveTo>
+                <a:lnTo>
+                  <a:pt x="3429755" y="0"/>
+                </a:lnTo>
+                <a:lnTo>
+                  <a:pt x="3526016" y="148742"/>
+                </a:lnTo>
+                <a:cubicBezTo>
+                  <a:pt x="3657740" y="365513"/>
+                  <a:pt x="3777402" y="589569"/>
+                  <a:pt x="3886489" y="819975"/>
+                </a:cubicBezTo>
+                <a:cubicBezTo>
+                  <a:pt x="3891856" y="833492"/>
+                  <a:pt x="3900663" y="845393"/>
+                  <a:pt x="3912049" y="854514"/>
+                </a:cubicBezTo>
+                <a:cubicBezTo>
+                  <a:pt x="3897352" y="819849"/>
+                  <a:pt x="3883037" y="784928"/>
+                  <a:pt x="3868083" y="750263"/>
+                </a:cubicBezTo>
+                <a:cubicBezTo>
+                  <a:pt x="3806989" y="608712"/>
+                  <a:pt x="3742478" y="469145"/>
+                  <a:pt x="3674155" y="331786"/>
+                </a:cubicBezTo>
+                <a:lnTo>
+                  <a:pt x="3496656" y="0"/>
+                </a:lnTo>
+                <a:lnTo>
+                  <a:pt x="3554371" y="0"/>
+                </a:lnTo>
+                <a:lnTo>
+                  <a:pt x="3661621" y="196614"/>
+                </a:lnTo>
+                <a:cubicBezTo>
+                  <a:pt x="3856899" y="573253"/>
+                  <a:pt x="4021071" y="966066"/>
+                  <a:pt x="4161279" y="1371196"/>
+                </a:cubicBezTo>
+                <a:cubicBezTo>
+                  <a:pt x="4379525" y="2007265"/>
+                  <a:pt x="4530141" y="2664286"/>
+                  <a:pt x="4610660" y="3331516"/>
+                </a:cubicBezTo>
+                <a:cubicBezTo>
+                  <a:pt x="4652837" y="3672965"/>
+                  <a:pt x="4671625" y="4013908"/>
+                  <a:pt x="4645040" y="4357388"/>
+                </a:cubicBezTo>
+                <a:cubicBezTo>
+                  <a:pt x="4613599" y="4758899"/>
+                  <a:pt x="4566181" y="5157998"/>
+                  <a:pt x="4485789" y="5552906"/>
+                </a:cubicBezTo>
+                <a:cubicBezTo>
+                  <a:pt x="4397121" y="5988893"/>
+                  <a:pt x="4276748" y="6414594"/>
+                  <a:pt x="4117769" y="6828295"/>
+                </a:cubicBezTo>
+                <a:lnTo>
+                  <a:pt x="4105288" y="6858000"/>
+                </a:lnTo>
+                <a:lnTo>
+                  <a:pt x="4052520" y="6858000"/>
+                </a:lnTo>
+                <a:lnTo>
+                  <a:pt x="4059369" y="6841549"/>
+                </a:lnTo>
+                <a:cubicBezTo>
+                  <a:pt x="4147276" y="6614016"/>
+                  <a:pt x="4224193" y="6380817"/>
+                  <a:pt x="4291518" y="6142729"/>
+                </a:cubicBezTo>
+                <a:cubicBezTo>
+                  <a:pt x="4350055" y="5935370"/>
+                  <a:pt x="4393256" y="5723695"/>
+                  <a:pt x="4443357" y="5513923"/>
+                </a:cubicBezTo>
+                <a:cubicBezTo>
+                  <a:pt x="4444541" y="5502788"/>
+                  <a:pt x="4445137" y="5491601"/>
+                  <a:pt x="4445146" y="5480401"/>
+                </a:cubicBezTo>
+                <a:cubicBezTo>
+                  <a:pt x="4408465" y="5607635"/>
+                  <a:pt x="4379196" y="5719759"/>
+                  <a:pt x="4344559" y="5830359"/>
+                </a:cubicBezTo>
+                <a:cubicBezTo>
+                  <a:pt x="4254261" y="6118381"/>
+                  <a:pt x="4150112" y="6398531"/>
+                  <a:pt x="4031702" y="6670527"/>
+                </a:cubicBezTo>
+                <a:lnTo>
+                  <a:pt x="3943824" y="6858000"/>
+                </a:lnTo>
+                <a:lnTo>
+                  <a:pt x="0" y="6858000"/>
+                </a:lnTo>
+                <a:close/>
+              </a:path>
+            </a:pathLst>
+          </a:custGeom>
+        </p:spPr>
+      </p:pic>
+    </p:spTree>
+    <p:extLst>
+      <p:ext uri="{BB962C8B-B14F-4D97-AF65-F5344CB8AC3E}">
+        <p14:creationId xmlns:p14="http://schemas.microsoft.com/office/powerpoint/2010/main" val="3504170990"/>
+      </p:ext>
+    </p:extLst>
+  </p:cSld>
+  <p:clrMapOvr>
+    <a:masterClrMapping/>
+  </p:clrMapOvr>
+</p:sld>
+</file>
+
+<file path=ppt/slides/slide11.xml><?xml version="1.0" encoding="utf-8"?>
 <p:sld xmlns:a="http://schemas.openxmlformats.org/drawingml/2006/main" xmlns:r="http://schemas.openxmlformats.org/officeDocument/2006/relationships" xmlns:p="http://schemas.openxmlformats.org/presentationml/2006/main">
   <p:cSld>
     <p:bg>
@@ -12076,688 +12756,6 @@
 </p:sld>
 </file>
 
-<file path=ppt/slides/slide11.xml><?xml version="1.0" encoding="utf-8"?>
-<p:sld xmlns:a="http://schemas.openxmlformats.org/drawingml/2006/main" xmlns:r="http://schemas.openxmlformats.org/officeDocument/2006/relationships" xmlns:p="http://schemas.openxmlformats.org/presentationml/2006/main">
-  <p:cSld>
-    <p:bg>
-      <p:bgPr>
-        <a:solidFill>
-          <a:schemeClr val="bg1"/>
-        </a:solidFill>
-        <a:effectLst/>
-      </p:bgPr>
-    </p:bg>
-    <p:spTree>
-      <p:nvGrpSpPr>
-        <p:cNvPr id="1" name=""/>
-        <p:cNvGrpSpPr/>
-        <p:nvPr/>
-      </p:nvGrpSpPr>
-      <p:grpSpPr>
-        <a:xfrm>
-          <a:off x="0" y="0"/>
-          <a:ext cx="0" cy="0"/>
-          <a:chOff x="0" y="0"/>
-          <a:chExt cx="0" cy="0"/>
-        </a:xfrm>
-      </p:grpSpPr>
-      <p:sp useBgFill="1">
-        <p:nvSpPr>
-          <p:cNvPr id="16" name="Rectangle 11">
-            <a:extLst>
-              <a:ext uri="{FF2B5EF4-FFF2-40B4-BE49-F238E27FC236}">
-                <a16:creationId xmlns:a16="http://schemas.microsoft.com/office/drawing/2014/main" id="{2C61293E-6EBE-43EF-A52C-9BEBFD7679D4}"/>
-              </a:ext>
-              <a:ext uri="{C183D7F6-B498-43B3-948B-1728B52AA6E4}">
-                <adec:decorative xmlns:adec="http://schemas.microsoft.com/office/drawing/2017/decorative" val="1"/>
-              </a:ext>
-            </a:extLst>
-          </p:cNvPr>
-          <p:cNvSpPr>
-            <a:spLocks noGrp="1" noRot="1" noChangeAspect="1" noMove="1" noResize="1" noEditPoints="1" noAdjustHandles="1" noChangeArrowheads="1" noChangeShapeType="1" noTextEdit="1"/>
-          </p:cNvSpPr>
-          <p:nvPr>
-            <p:extLst>
-              <p:ext uri="{386F3935-93C4-4BCD-93E2-E3B085C9AB24}">
-                <p16:designElem xmlns:p16="http://schemas.microsoft.com/office/powerpoint/2015/main" val="1"/>
-              </p:ext>
-            </p:extLst>
-          </p:nvPr>
-        </p:nvSpPr>
-        <p:spPr>
-          <a:xfrm>
-            <a:off x="0" y="0"/>
-            <a:ext cx="12188952" cy="6858000"/>
-          </a:xfrm>
-          <a:prstGeom prst="rect">
-            <a:avLst/>
-          </a:prstGeom>
-          <a:ln>
-            <a:noFill/>
-          </a:ln>
-        </p:spPr>
-        <p:style>
-          <a:lnRef idx="2">
-            <a:schemeClr val="accent1">
-              <a:shade val="50000"/>
-            </a:schemeClr>
-          </a:lnRef>
-          <a:fillRef idx="1">
-            <a:schemeClr val="accent1"/>
-          </a:fillRef>
-          <a:effectRef idx="0">
-            <a:schemeClr val="accent1"/>
-          </a:effectRef>
-          <a:fontRef idx="minor">
-            <a:schemeClr val="lt1"/>
-          </a:fontRef>
-        </p:style>
-        <p:txBody>
-          <a:bodyPr rtlCol="0" anchor="ctr"/>
-          <a:lstStyle/>
-          <a:p>
-            <a:pPr algn="ctr"/>
-            <a:endParaRPr lang="en-US"/>
-          </a:p>
-        </p:txBody>
-      </p:sp>
-      <p:sp>
-        <p:nvSpPr>
-          <p:cNvPr id="2" name="Titre 1">
-            <a:extLst>
-              <a:ext uri="{FF2B5EF4-FFF2-40B4-BE49-F238E27FC236}">
-                <a16:creationId xmlns:a16="http://schemas.microsoft.com/office/drawing/2014/main" id="{C02C3E2E-BE11-4D2A-812A-455C9CED5E54}"/>
-              </a:ext>
-            </a:extLst>
-          </p:cNvPr>
-          <p:cNvSpPr>
-            <a:spLocks noGrp="1"/>
-          </p:cNvSpPr>
-          <p:nvPr>
-            <p:ph type="title"/>
-          </p:nvPr>
-        </p:nvSpPr>
-        <p:spPr>
-          <a:xfrm>
-            <a:off x="5297762" y="329184"/>
-            <a:ext cx="6251110" cy="1783080"/>
-          </a:xfrm>
-        </p:spPr>
-        <p:txBody>
-          <a:bodyPr anchor="b">
-            <a:normAutofit/>
-          </a:bodyPr>
-          <a:lstStyle/>
-          <a:p>
-            <a:r>
-              <a:rPr lang="fr-FR" sz="7200"/>
-              <a:t>Trajectoires et motifs</a:t>
-            </a:r>
-          </a:p>
-        </p:txBody>
-      </p:sp>
-      <p:sp>
-        <p:nvSpPr>
-          <p:cNvPr id="17" name="Rectangle 6">
-            <a:extLst>
-              <a:ext uri="{FF2B5EF4-FFF2-40B4-BE49-F238E27FC236}">
-                <a16:creationId xmlns:a16="http://schemas.microsoft.com/office/drawing/2014/main" id="{3FCFB1DE-0B7E-48CC-BA90-B2AB0889F9D6}"/>
-              </a:ext>
-              <a:ext uri="{C183D7F6-B498-43B3-948B-1728B52AA6E4}">
-                <adec:decorative xmlns:adec="http://schemas.microsoft.com/office/drawing/2017/decorative" val="1"/>
-              </a:ext>
-            </a:extLst>
-          </p:cNvPr>
-          <p:cNvSpPr>
-            <a:spLocks noGrp="1" noRot="1" noChangeAspect="1" noMove="1" noResize="1" noEditPoints="1" noAdjustHandles="1" noChangeArrowheads="1" noChangeShapeType="1" noTextEdit="1"/>
-          </p:cNvSpPr>
-          <p:nvPr>
-            <p:extLst>
-              <p:ext uri="{386F3935-93C4-4BCD-93E2-E3B085C9AB24}">
-                <p16:designElem xmlns:p16="http://schemas.microsoft.com/office/powerpoint/2015/main" val="1"/>
-              </p:ext>
-            </p:extLst>
-          </p:nvPr>
-        </p:nvSpPr>
-        <p:spPr>
-          <a:xfrm>
-            <a:off x="5412862" y="2395728"/>
-            <a:ext cx="4243589" cy="27432"/>
-          </a:xfrm>
-          <a:custGeom>
-            <a:avLst/>
-            <a:gdLst>
-              <a:gd name="connsiteX0" fmla="*/ 0 w 4243589"/>
-              <a:gd name="connsiteY0" fmla="*/ 0 h 27432"/>
-              <a:gd name="connsiteX1" fmla="*/ 563791 w 4243589"/>
-              <a:gd name="connsiteY1" fmla="*/ 0 h 27432"/>
-              <a:gd name="connsiteX2" fmla="*/ 1042710 w 4243589"/>
-              <a:gd name="connsiteY2" fmla="*/ 0 h 27432"/>
-              <a:gd name="connsiteX3" fmla="*/ 1564066 w 4243589"/>
-              <a:gd name="connsiteY3" fmla="*/ 0 h 27432"/>
-              <a:gd name="connsiteX4" fmla="*/ 2212729 w 4243589"/>
-              <a:gd name="connsiteY4" fmla="*/ 0 h 27432"/>
-              <a:gd name="connsiteX5" fmla="*/ 2776520 w 4243589"/>
-              <a:gd name="connsiteY5" fmla="*/ 0 h 27432"/>
-              <a:gd name="connsiteX6" fmla="*/ 3297875 w 4243589"/>
-              <a:gd name="connsiteY6" fmla="*/ 0 h 27432"/>
-              <a:gd name="connsiteX7" fmla="*/ 4243589 w 4243589"/>
-              <a:gd name="connsiteY7" fmla="*/ 0 h 27432"/>
-              <a:gd name="connsiteX8" fmla="*/ 4243589 w 4243589"/>
-              <a:gd name="connsiteY8" fmla="*/ 27432 h 27432"/>
-              <a:gd name="connsiteX9" fmla="*/ 3637362 w 4243589"/>
-              <a:gd name="connsiteY9" fmla="*/ 27432 h 27432"/>
-              <a:gd name="connsiteX10" fmla="*/ 3116007 w 4243589"/>
-              <a:gd name="connsiteY10" fmla="*/ 27432 h 27432"/>
-              <a:gd name="connsiteX11" fmla="*/ 2424908 w 4243589"/>
-              <a:gd name="connsiteY11" fmla="*/ 27432 h 27432"/>
-              <a:gd name="connsiteX12" fmla="*/ 1861117 w 4243589"/>
-              <a:gd name="connsiteY12" fmla="*/ 27432 h 27432"/>
-              <a:gd name="connsiteX13" fmla="*/ 1382198 w 4243589"/>
-              <a:gd name="connsiteY13" fmla="*/ 27432 h 27432"/>
-              <a:gd name="connsiteX14" fmla="*/ 733535 w 4243589"/>
-              <a:gd name="connsiteY14" fmla="*/ 27432 h 27432"/>
-              <a:gd name="connsiteX15" fmla="*/ 0 w 4243589"/>
-              <a:gd name="connsiteY15" fmla="*/ 27432 h 27432"/>
-              <a:gd name="connsiteX16" fmla="*/ 0 w 4243589"/>
-              <a:gd name="connsiteY16" fmla="*/ 0 h 27432"/>
-            </a:gdLst>
-            <a:ahLst/>
-            <a:cxnLst>
-              <a:cxn ang="0">
-                <a:pos x="connsiteX0" y="connsiteY0"/>
-              </a:cxn>
-              <a:cxn ang="0">
-                <a:pos x="connsiteX1" y="connsiteY1"/>
-              </a:cxn>
-              <a:cxn ang="0">
-                <a:pos x="connsiteX2" y="connsiteY2"/>
-              </a:cxn>
-              <a:cxn ang="0">
-                <a:pos x="connsiteX3" y="connsiteY3"/>
-              </a:cxn>
-              <a:cxn ang="0">
-                <a:pos x="connsiteX4" y="connsiteY4"/>
-              </a:cxn>
-              <a:cxn ang="0">
-                <a:pos x="connsiteX5" y="connsiteY5"/>
-              </a:cxn>
-              <a:cxn ang="0">
-                <a:pos x="connsiteX6" y="connsiteY6"/>
-              </a:cxn>
-              <a:cxn ang="0">
-                <a:pos x="connsiteX7" y="connsiteY7"/>
-              </a:cxn>
-              <a:cxn ang="0">
-                <a:pos x="connsiteX8" y="connsiteY8"/>
-              </a:cxn>
-              <a:cxn ang="0">
-                <a:pos x="connsiteX9" y="connsiteY9"/>
-              </a:cxn>
-              <a:cxn ang="0">
-                <a:pos x="connsiteX10" y="connsiteY10"/>
-              </a:cxn>
-              <a:cxn ang="0">
-                <a:pos x="connsiteX11" y="connsiteY11"/>
-              </a:cxn>
-              <a:cxn ang="0">
-                <a:pos x="connsiteX12" y="connsiteY12"/>
-              </a:cxn>
-              <a:cxn ang="0">
-                <a:pos x="connsiteX13" y="connsiteY13"/>
-              </a:cxn>
-              <a:cxn ang="0">
-                <a:pos x="connsiteX14" y="connsiteY14"/>
-              </a:cxn>
-              <a:cxn ang="0">
-                <a:pos x="connsiteX15" y="connsiteY15"/>
-              </a:cxn>
-              <a:cxn ang="0">
-                <a:pos x="connsiteX16" y="connsiteY16"/>
-              </a:cxn>
-            </a:cxnLst>
-            <a:rect l="l" t="t" r="r" b="b"/>
-            <a:pathLst>
-              <a:path w="4243589" h="27432" fill="none" extrusionOk="0">
-                <a:moveTo>
-                  <a:pt x="0" y="0"/>
-                </a:moveTo>
-                <a:cubicBezTo>
-                  <a:pt x="157351" y="-15653"/>
-                  <a:pt x="378877" y="-5828"/>
-                  <a:pt x="563791" y="0"/>
-                </a:cubicBezTo>
-                <a:cubicBezTo>
-                  <a:pt x="748705" y="5828"/>
-                  <a:pt x="905659" y="-5525"/>
-                  <a:pt x="1042710" y="0"/>
-                </a:cubicBezTo>
-                <a:cubicBezTo>
-                  <a:pt x="1179761" y="5525"/>
-                  <a:pt x="1356845" y="-21288"/>
-                  <a:pt x="1564066" y="0"/>
-                </a:cubicBezTo>
-                <a:cubicBezTo>
-                  <a:pt x="1771287" y="21288"/>
-                  <a:pt x="1912099" y="25135"/>
-                  <a:pt x="2212729" y="0"/>
-                </a:cubicBezTo>
-                <a:cubicBezTo>
-                  <a:pt x="2513359" y="-25135"/>
-                  <a:pt x="2514918" y="-27119"/>
-                  <a:pt x="2776520" y="0"/>
-                </a:cubicBezTo>
-                <a:cubicBezTo>
-                  <a:pt x="3038122" y="27119"/>
-                  <a:pt x="3178771" y="18116"/>
-                  <a:pt x="3297875" y="0"/>
-                </a:cubicBezTo>
-                <a:cubicBezTo>
-                  <a:pt x="3416980" y="-18116"/>
-                  <a:pt x="4012240" y="-40869"/>
-                  <a:pt x="4243589" y="0"/>
-                </a:cubicBezTo>
-                <a:cubicBezTo>
-                  <a:pt x="4242616" y="8304"/>
-                  <a:pt x="4243111" y="21512"/>
-                  <a:pt x="4243589" y="27432"/>
-                </a:cubicBezTo>
-                <a:cubicBezTo>
-                  <a:pt x="4112949" y="6289"/>
-                  <a:pt x="3928037" y="10975"/>
-                  <a:pt x="3637362" y="27432"/>
-                </a:cubicBezTo>
-                <a:cubicBezTo>
-                  <a:pt x="3346687" y="43889"/>
-                  <a:pt x="3254446" y="35813"/>
-                  <a:pt x="3116007" y="27432"/>
-                </a:cubicBezTo>
-                <a:cubicBezTo>
-                  <a:pt x="2977569" y="19051"/>
-                  <a:pt x="2620228" y="38017"/>
-                  <a:pt x="2424908" y="27432"/>
-                </a:cubicBezTo>
-                <a:cubicBezTo>
-                  <a:pt x="2229588" y="16847"/>
-                  <a:pt x="2088287" y="5290"/>
-                  <a:pt x="1861117" y="27432"/>
-                </a:cubicBezTo>
-                <a:cubicBezTo>
-                  <a:pt x="1633947" y="49574"/>
-                  <a:pt x="1502447" y="8273"/>
-                  <a:pt x="1382198" y="27432"/>
-                </a:cubicBezTo>
-                <a:cubicBezTo>
-                  <a:pt x="1261949" y="46591"/>
-                  <a:pt x="1045440" y="37497"/>
-                  <a:pt x="733535" y="27432"/>
-                </a:cubicBezTo>
-                <a:cubicBezTo>
-                  <a:pt x="421630" y="17367"/>
-                  <a:pt x="341257" y="-9215"/>
-                  <a:pt x="0" y="27432"/>
-                </a:cubicBezTo>
-                <a:cubicBezTo>
-                  <a:pt x="-1048" y="14992"/>
-                  <a:pt x="-1120" y="7447"/>
-                  <a:pt x="0" y="0"/>
-                </a:cubicBezTo>
-                <a:close/>
-              </a:path>
-              <a:path w="4243589" h="27432" stroke="0" extrusionOk="0">
-                <a:moveTo>
-                  <a:pt x="0" y="0"/>
-                </a:moveTo>
-                <a:cubicBezTo>
-                  <a:pt x="128164" y="17204"/>
-                  <a:pt x="312653" y="1129"/>
-                  <a:pt x="563791" y="0"/>
-                </a:cubicBezTo>
-                <a:cubicBezTo>
-                  <a:pt x="814929" y="-1129"/>
-                  <a:pt x="837271" y="8503"/>
-                  <a:pt x="1042710" y="0"/>
-                </a:cubicBezTo>
-                <a:cubicBezTo>
-                  <a:pt x="1248149" y="-8503"/>
-                  <a:pt x="1588432" y="-28862"/>
-                  <a:pt x="1733809" y="0"/>
-                </a:cubicBezTo>
-                <a:cubicBezTo>
-                  <a:pt x="1879186" y="28862"/>
-                  <a:pt x="2052815" y="5974"/>
-                  <a:pt x="2297600" y="0"/>
-                </a:cubicBezTo>
-                <a:cubicBezTo>
-                  <a:pt x="2542385" y="-5974"/>
-                  <a:pt x="2699960" y="-23550"/>
-                  <a:pt x="2861391" y="0"/>
-                </a:cubicBezTo>
-                <a:cubicBezTo>
-                  <a:pt x="3022822" y="23550"/>
-                  <a:pt x="3390411" y="25272"/>
-                  <a:pt x="3552490" y="0"/>
-                </a:cubicBezTo>
-                <a:cubicBezTo>
-                  <a:pt x="3714569" y="-25272"/>
-                  <a:pt x="3950585" y="-31327"/>
-                  <a:pt x="4243589" y="0"/>
-                </a:cubicBezTo>
-                <a:cubicBezTo>
-                  <a:pt x="4244074" y="9333"/>
-                  <a:pt x="4244867" y="19699"/>
-                  <a:pt x="4243589" y="27432"/>
-                </a:cubicBezTo>
-                <a:cubicBezTo>
-                  <a:pt x="4130424" y="7904"/>
-                  <a:pt x="3932803" y="51393"/>
-                  <a:pt x="3722234" y="27432"/>
-                </a:cubicBezTo>
-                <a:cubicBezTo>
-                  <a:pt x="3511665" y="3471"/>
-                  <a:pt x="3269903" y="55138"/>
-                  <a:pt x="3116007" y="27432"/>
-                </a:cubicBezTo>
-                <a:cubicBezTo>
-                  <a:pt x="2962111" y="-274"/>
-                  <a:pt x="2744280" y="32368"/>
-                  <a:pt x="2509780" y="27432"/>
-                </a:cubicBezTo>
-                <a:cubicBezTo>
-                  <a:pt x="2275280" y="22496"/>
-                  <a:pt x="2066059" y="52808"/>
-                  <a:pt x="1945989" y="27432"/>
-                </a:cubicBezTo>
-                <a:cubicBezTo>
-                  <a:pt x="1825919" y="2056"/>
-                  <a:pt x="1407329" y="21760"/>
-                  <a:pt x="1254890" y="27432"/>
-                </a:cubicBezTo>
-                <a:cubicBezTo>
-                  <a:pt x="1102451" y="33104"/>
-                  <a:pt x="837950" y="40817"/>
-                  <a:pt x="563791" y="27432"/>
-                </a:cubicBezTo>
-                <a:cubicBezTo>
-                  <a:pt x="289632" y="14047"/>
-                  <a:pt x="132768" y="16249"/>
-                  <a:pt x="0" y="27432"/>
-                </a:cubicBezTo>
-                <a:cubicBezTo>
-                  <a:pt x="211" y="18145"/>
-                  <a:pt x="120" y="6480"/>
-                  <a:pt x="0" y="0"/>
-                </a:cubicBezTo>
-                <a:close/>
-              </a:path>
-            </a:pathLst>
-          </a:custGeom>
-          <a:solidFill>
-            <a:srgbClr val="D55D3B"/>
-          </a:solidFill>
-          <a:ln w="38100" cap="rnd">
-            <a:solidFill>
-              <a:srgbClr val="D55D3B"/>
-            </a:solidFill>
-            <a:round/>
-            <a:extLst>
-              <a:ext uri="{C807C97D-BFC1-408E-A445-0C87EB9F89A2}">
-                <ask:lineSketchStyleProps xmlns:ask="http://schemas.microsoft.com/office/drawing/2018/sketchyshapes" sd="1219033472">
-                  <a:prstGeom prst="rect">
-                    <a:avLst/>
-                  </a:prstGeom>
-                  <ask:type>
-                    <ask:lineSketchFreehand/>
-                  </ask:type>
-                </ask:lineSketchStyleProps>
-              </a:ext>
-            </a:extLst>
-          </a:ln>
-        </p:spPr>
-        <p:style>
-          <a:lnRef idx="2">
-            <a:schemeClr val="accent1">
-              <a:shade val="50000"/>
-            </a:schemeClr>
-          </a:lnRef>
-          <a:fillRef idx="1">
-            <a:schemeClr val="accent1"/>
-          </a:fillRef>
-          <a:effectRef idx="0">
-            <a:schemeClr val="accent1"/>
-          </a:effectRef>
-          <a:fontRef idx="minor">
-            <a:schemeClr val="lt1"/>
-          </a:fontRef>
-        </p:style>
-        <p:txBody>
-          <a:bodyPr rtlCol="0" anchor="ctr"/>
-          <a:lstStyle/>
-          <a:p>
-            <a:pPr algn="ctr"/>
-            <a:endParaRPr lang="en-US"/>
-          </a:p>
-        </p:txBody>
-      </p:sp>
-      <p:sp>
-        <p:nvSpPr>
-          <p:cNvPr id="3" name="Espace réservé du contenu 2">
-            <a:extLst>
-              <a:ext uri="{FF2B5EF4-FFF2-40B4-BE49-F238E27FC236}">
-                <a16:creationId xmlns:a16="http://schemas.microsoft.com/office/drawing/2014/main" id="{AF59C72B-C8A8-4636-BB41-41C40D98FC12}"/>
-              </a:ext>
-            </a:extLst>
-          </p:cNvPr>
-          <p:cNvSpPr>
-            <a:spLocks noGrp="1"/>
-          </p:cNvSpPr>
-          <p:nvPr>
-            <p:ph idx="1"/>
-          </p:nvPr>
-        </p:nvSpPr>
-        <p:spPr>
-          <a:xfrm>
-            <a:off x="5297762" y="2706624"/>
-            <a:ext cx="6251110" cy="3483864"/>
-          </a:xfrm>
-        </p:spPr>
-        <p:txBody>
-          <a:bodyPr>
-            <a:noAutofit/>
-          </a:bodyPr>
-          <a:lstStyle/>
-          <a:p>
-            <a:r>
-              <a:rPr lang="fr-FR" sz="3600" dirty="0"/>
-              <a:t>Courbes mathématiques</a:t>
-            </a:r>
-          </a:p>
-          <a:p>
-            <a:r>
-              <a:rPr lang="fr-FR" sz="3600" dirty="0"/>
-              <a:t>Trajectoires relatives à un mobile</a:t>
-            </a:r>
-          </a:p>
-          <a:p>
-            <a:r>
-              <a:rPr lang="fr-FR" sz="3600" dirty="0"/>
-              <a:t>Chemins</a:t>
-            </a:r>
-          </a:p>
-          <a:p>
-            <a:r>
-              <a:rPr lang="fr-FR" sz="3600" dirty="0"/>
-              <a:t>Mise en place en fonction du temps</a:t>
-            </a:r>
-          </a:p>
-          <a:p>
-            <a:r>
-              <a:rPr lang="fr-FR" sz="3600" dirty="0"/>
-              <a:t>Cumul des différents types</a:t>
-            </a:r>
-          </a:p>
-        </p:txBody>
-      </p:sp>
-      <p:pic>
-        <p:nvPicPr>
-          <p:cNvPr id="7" name="Image 6">
-            <a:extLst>
-              <a:ext uri="{FF2B5EF4-FFF2-40B4-BE49-F238E27FC236}">
-                <a16:creationId xmlns:a16="http://schemas.microsoft.com/office/drawing/2014/main" id="{980B4CEF-ACB5-46D6-A57D-C6A4D05C13EA}"/>
-              </a:ext>
-            </a:extLst>
-          </p:cNvPr>
-          <p:cNvPicPr>
-            <a:picLocks noChangeAspect="1"/>
-          </p:cNvPicPr>
-          <p:nvPr/>
-        </p:nvPicPr>
-        <p:blipFill rotWithShape="1">
-          <a:blip r:embed="rId2">
-            <a:extLst>
-              <a:ext uri="{28A0092B-C50C-407E-A947-70E740481C1C}">
-                <a14:useLocalDpi xmlns:a14="http://schemas.microsoft.com/office/drawing/2010/main" val="0"/>
-              </a:ext>
-            </a:extLst>
-          </a:blip>
-          <a:srcRect l="18939" r="12923"/>
-          <a:stretch/>
-        </p:blipFill>
-        <p:spPr>
-          <a:xfrm>
-            <a:off x="1" y="10"/>
-            <a:ext cx="4657344" cy="6857990"/>
-          </a:xfrm>
-          <a:custGeom>
-            <a:avLst/>
-            <a:gdLst/>
-            <a:ahLst/>
-            <a:cxnLst/>
-            <a:rect l="l" t="t" r="r" b="b"/>
-            <a:pathLst>
-              <a:path w="4657344" h="6858000">
-                <a:moveTo>
-                  <a:pt x="0" y="0"/>
-                </a:moveTo>
-                <a:lnTo>
-                  <a:pt x="3429755" y="0"/>
-                </a:lnTo>
-                <a:lnTo>
-                  <a:pt x="3526016" y="148742"/>
-                </a:lnTo>
-                <a:cubicBezTo>
-                  <a:pt x="3657740" y="365513"/>
-                  <a:pt x="3777402" y="589569"/>
-                  <a:pt x="3886489" y="819975"/>
-                </a:cubicBezTo>
-                <a:cubicBezTo>
-                  <a:pt x="3891856" y="833492"/>
-                  <a:pt x="3900663" y="845393"/>
-                  <a:pt x="3912049" y="854514"/>
-                </a:cubicBezTo>
-                <a:cubicBezTo>
-                  <a:pt x="3897352" y="819849"/>
-                  <a:pt x="3883037" y="784928"/>
-                  <a:pt x="3868083" y="750263"/>
-                </a:cubicBezTo>
-                <a:cubicBezTo>
-                  <a:pt x="3806989" y="608712"/>
-                  <a:pt x="3742478" y="469145"/>
-                  <a:pt x="3674155" y="331786"/>
-                </a:cubicBezTo>
-                <a:lnTo>
-                  <a:pt x="3496656" y="0"/>
-                </a:lnTo>
-                <a:lnTo>
-                  <a:pt x="3554371" y="0"/>
-                </a:lnTo>
-                <a:lnTo>
-                  <a:pt x="3661621" y="196614"/>
-                </a:lnTo>
-                <a:cubicBezTo>
-                  <a:pt x="3856899" y="573253"/>
-                  <a:pt x="4021071" y="966066"/>
-                  <a:pt x="4161279" y="1371196"/>
-                </a:cubicBezTo>
-                <a:cubicBezTo>
-                  <a:pt x="4379525" y="2007265"/>
-                  <a:pt x="4530141" y="2664286"/>
-                  <a:pt x="4610660" y="3331516"/>
-                </a:cubicBezTo>
-                <a:cubicBezTo>
-                  <a:pt x="4652837" y="3672965"/>
-                  <a:pt x="4671625" y="4013908"/>
-                  <a:pt x="4645040" y="4357388"/>
-                </a:cubicBezTo>
-                <a:cubicBezTo>
-                  <a:pt x="4613599" y="4758899"/>
-                  <a:pt x="4566181" y="5157998"/>
-                  <a:pt x="4485789" y="5552906"/>
-                </a:cubicBezTo>
-                <a:cubicBezTo>
-                  <a:pt x="4397121" y="5988893"/>
-                  <a:pt x="4276748" y="6414594"/>
-                  <a:pt x="4117769" y="6828295"/>
-                </a:cubicBezTo>
-                <a:lnTo>
-                  <a:pt x="4105288" y="6858000"/>
-                </a:lnTo>
-                <a:lnTo>
-                  <a:pt x="4052520" y="6858000"/>
-                </a:lnTo>
-                <a:lnTo>
-                  <a:pt x="4059369" y="6841549"/>
-                </a:lnTo>
-                <a:cubicBezTo>
-                  <a:pt x="4147276" y="6614016"/>
-                  <a:pt x="4224193" y="6380817"/>
-                  <a:pt x="4291518" y="6142729"/>
-                </a:cubicBezTo>
-                <a:cubicBezTo>
-                  <a:pt x="4350055" y="5935370"/>
-                  <a:pt x="4393256" y="5723695"/>
-                  <a:pt x="4443357" y="5513923"/>
-                </a:cubicBezTo>
-                <a:cubicBezTo>
-                  <a:pt x="4444541" y="5502788"/>
-                  <a:pt x="4445137" y="5491601"/>
-                  <a:pt x="4445146" y="5480401"/>
-                </a:cubicBezTo>
-                <a:cubicBezTo>
-                  <a:pt x="4408465" y="5607635"/>
-                  <a:pt x="4379196" y="5719759"/>
-                  <a:pt x="4344559" y="5830359"/>
-                </a:cubicBezTo>
-                <a:cubicBezTo>
-                  <a:pt x="4254261" y="6118381"/>
-                  <a:pt x="4150112" y="6398531"/>
-                  <a:pt x="4031702" y="6670527"/>
-                </a:cubicBezTo>
-                <a:lnTo>
-                  <a:pt x="3943824" y="6858000"/>
-                </a:lnTo>
-                <a:lnTo>
-                  <a:pt x="0" y="6858000"/>
-                </a:lnTo>
-                <a:close/>
-              </a:path>
-            </a:pathLst>
-          </a:custGeom>
-        </p:spPr>
-      </p:pic>
-    </p:spTree>
-    <p:extLst>
-      <p:ext uri="{BB962C8B-B14F-4D97-AF65-F5344CB8AC3E}">
-        <p14:creationId xmlns:p14="http://schemas.microsoft.com/office/powerpoint/2010/main" val="3504170990"/>
-      </p:ext>
-    </p:extLst>
-  </p:cSld>
-  <p:clrMapOvr>
-    <a:masterClrMapping/>
-  </p:clrMapOvr>
-</p:sld>
-</file>
-
 <file path=ppt/slides/slide12.xml><?xml version="1.0" encoding="utf-8"?>
 <p:sld xmlns:a="http://schemas.openxmlformats.org/drawingml/2006/main" xmlns:r="http://schemas.openxmlformats.org/officeDocument/2006/relationships" xmlns:p="http://schemas.openxmlformats.org/presentationml/2006/main">
   <p:cSld>
@@ -14741,6 +14739,587 @@
 <file path=ppt/slides/slide2.xml><?xml version="1.0" encoding="utf-8"?>
 <p:sld xmlns:a="http://schemas.openxmlformats.org/drawingml/2006/main" xmlns:r="http://schemas.openxmlformats.org/officeDocument/2006/relationships" xmlns:p="http://schemas.openxmlformats.org/presentationml/2006/main">
   <p:cSld>
+    <p:spTree>
+      <p:nvGrpSpPr>
+        <p:cNvPr id="1" name=""/>
+        <p:cNvGrpSpPr/>
+        <p:nvPr/>
+      </p:nvGrpSpPr>
+      <p:grpSpPr>
+        <a:xfrm>
+          <a:off x="0" y="0"/>
+          <a:ext cx="0" cy="0"/>
+          <a:chOff x="0" y="0"/>
+          <a:chExt cx="0" cy="0"/>
+        </a:xfrm>
+      </p:grpSpPr>
+      <p:sp>
+        <p:nvSpPr>
+          <p:cNvPr id="18" name="Espace réservé du contenu 17">
+            <a:extLst>
+              <a:ext uri="{FF2B5EF4-FFF2-40B4-BE49-F238E27FC236}">
+                <a16:creationId xmlns:a16="http://schemas.microsoft.com/office/drawing/2014/main" id="{BDB7BE19-6890-44A2-A760-9137CEAF5FD0}"/>
+              </a:ext>
+            </a:extLst>
+          </p:cNvPr>
+          <p:cNvSpPr>
+            <a:spLocks noGrp="1"/>
+          </p:cNvSpPr>
+          <p:nvPr>
+            <p:ph idx="4294967295"/>
+          </p:nvPr>
+        </p:nvSpPr>
+        <p:spPr>
+          <a:xfrm>
+            <a:off x="0" y="0"/>
+            <a:ext cx="3878178" cy="6857999"/>
+          </a:xfrm>
+        </p:spPr>
+        <p:txBody>
+          <a:bodyPr>
+            <a:normAutofit/>
+          </a:bodyPr>
+          <a:lstStyle/>
+          <a:p>
+            <a:pPr algn="ctr">
+              <a:lnSpc>
+                <a:spcPct val="150000"/>
+              </a:lnSpc>
+            </a:pPr>
+            <a:r>
+              <a:rPr lang="fr-FR" sz="4400" dirty="0" err="1"/>
+              <a:t>SpaceWar</a:t>
+            </a:r>
+            <a:r>
+              <a:rPr lang="fr-FR" sz="4400" dirty="0"/>
+              <a:t>! 1962</a:t>
+            </a:r>
+          </a:p>
+          <a:p>
+            <a:pPr algn="ctr">
+              <a:lnSpc>
+                <a:spcPct val="150000"/>
+              </a:lnSpc>
+            </a:pPr>
+            <a:r>
+              <a:rPr lang="fr-FR" sz="4400" dirty="0" err="1"/>
+              <a:t>Space</a:t>
+            </a:r>
+            <a:r>
+              <a:rPr lang="fr-FR" sz="4400" dirty="0"/>
+              <a:t> </a:t>
+            </a:r>
+            <a:r>
+              <a:rPr lang="fr-FR" sz="4400" dirty="0" err="1"/>
+              <a:t>Invaders</a:t>
+            </a:r>
+            <a:r>
+              <a:rPr lang="fr-FR" sz="4400" dirty="0"/>
+              <a:t> 1978</a:t>
+            </a:r>
+          </a:p>
+          <a:p>
+            <a:pPr algn="ctr">
+              <a:lnSpc>
+                <a:spcPct val="150000"/>
+              </a:lnSpc>
+            </a:pPr>
+            <a:r>
+              <a:rPr lang="fr-FR" sz="4400" dirty="0" err="1"/>
+              <a:t>Ikaruga</a:t>
+            </a:r>
+            <a:r>
+              <a:rPr lang="fr-FR" sz="4400" dirty="0"/>
+              <a:t> 2001</a:t>
+            </a:r>
+          </a:p>
+          <a:p>
+            <a:pPr algn="ctr">
+              <a:lnSpc>
+                <a:spcPct val="150000"/>
+              </a:lnSpc>
+            </a:pPr>
+            <a:r>
+              <a:rPr lang="fr-FR" sz="4400" dirty="0" err="1"/>
+              <a:t>Gradius</a:t>
+            </a:r>
+            <a:r>
+              <a:rPr lang="fr-FR" sz="4400" dirty="0"/>
+              <a:t> V 2004</a:t>
+            </a:r>
+          </a:p>
+          <a:p>
+            <a:pPr algn="ctr">
+              <a:lnSpc>
+                <a:spcPct val="150000"/>
+              </a:lnSpc>
+            </a:pPr>
+            <a:r>
+              <a:rPr lang="fr-FR" sz="4400" dirty="0" err="1"/>
+              <a:t>Nier:Automata</a:t>
+            </a:r>
+            <a:r>
+              <a:rPr lang="fr-FR" sz="4400" dirty="0"/>
+              <a:t> 2017</a:t>
+            </a:r>
+          </a:p>
+          <a:p>
+            <a:pPr algn="ctr">
+              <a:lnSpc>
+                <a:spcPct val="150000"/>
+              </a:lnSpc>
+            </a:pPr>
+            <a:r>
+              <a:rPr lang="fr-FR" sz="4400" dirty="0" err="1"/>
+              <a:t>Returnal</a:t>
+            </a:r>
+            <a:r>
+              <a:rPr lang="fr-FR" sz="4400" dirty="0"/>
+              <a:t> 2021</a:t>
+            </a:r>
+          </a:p>
+        </p:txBody>
+      </p:sp>
+      <p:sp>
+        <p:nvSpPr>
+          <p:cNvPr id="9" name="Titre 1">
+            <a:extLst>
+              <a:ext uri="{FF2B5EF4-FFF2-40B4-BE49-F238E27FC236}">
+                <a16:creationId xmlns:a16="http://schemas.microsoft.com/office/drawing/2014/main" id="{2DFF482D-3FC5-45EB-94F6-7050A003901B}"/>
+              </a:ext>
+            </a:extLst>
+          </p:cNvPr>
+          <p:cNvSpPr txBox="1">
+            <a:spLocks/>
+          </p:cNvSpPr>
+          <p:nvPr/>
+        </p:nvSpPr>
+        <p:spPr>
+          <a:xfrm>
+            <a:off x="7650410" y="390292"/>
+            <a:ext cx="2987180" cy="1325563"/>
+          </a:xfrm>
+          <a:prstGeom prst="rect">
+            <a:avLst/>
+          </a:prstGeom>
+        </p:spPr>
+        <p:txBody>
+          <a:bodyPr vert="horz" lIns="91440" tIns="45720" rIns="91440" bIns="45720" rtlCol="0" anchor="ctr">
+            <a:normAutofit/>
+          </a:bodyPr>
+          <a:lstStyle>
+            <a:lvl1pPr algn="l" defTabSz="914400" rtl="0" eaLnBrk="1" latinLnBrk="0" hangingPunct="1">
+              <a:lnSpc>
+                <a:spcPct val="100000"/>
+              </a:lnSpc>
+              <a:spcBef>
+                <a:spcPct val="0"/>
+              </a:spcBef>
+              <a:buNone/>
+              <a:defRPr sz="5400" kern="1200">
+                <a:solidFill>
+                  <a:schemeClr val="tx1"/>
+                </a:solidFill>
+                <a:latin typeface="+mj-lt"/>
+                <a:ea typeface="+mj-ea"/>
+                <a:cs typeface="+mj-cs"/>
+              </a:defRPr>
+            </a:lvl1pPr>
+          </a:lstStyle>
+          <a:p>
+            <a:pPr algn="ctr"/>
+            <a:endParaRPr lang="fr-FR" sz="2800" dirty="0"/>
+          </a:p>
+        </p:txBody>
+      </p:sp>
+      <p:sp>
+        <p:nvSpPr>
+          <p:cNvPr id="10" name="Titre 1">
+            <a:extLst>
+              <a:ext uri="{FF2B5EF4-FFF2-40B4-BE49-F238E27FC236}">
+                <a16:creationId xmlns:a16="http://schemas.microsoft.com/office/drawing/2014/main" id="{207B1B70-16E8-4B2D-82F5-D97D77D736D4}"/>
+              </a:ext>
+            </a:extLst>
+          </p:cNvPr>
+          <p:cNvSpPr txBox="1">
+            <a:spLocks/>
+          </p:cNvSpPr>
+          <p:nvPr/>
+        </p:nvSpPr>
+        <p:spPr>
+          <a:xfrm>
+            <a:off x="3784781" y="2337316"/>
+            <a:ext cx="2987180" cy="1325563"/>
+          </a:xfrm>
+          <a:prstGeom prst="rect">
+            <a:avLst/>
+          </a:prstGeom>
+        </p:spPr>
+        <p:txBody>
+          <a:bodyPr vert="horz" lIns="91440" tIns="45720" rIns="91440" bIns="45720" rtlCol="0" anchor="ctr">
+            <a:normAutofit/>
+          </a:bodyPr>
+          <a:lstStyle>
+            <a:lvl1pPr algn="l" defTabSz="914400" rtl="0" eaLnBrk="1" latinLnBrk="0" hangingPunct="1">
+              <a:lnSpc>
+                <a:spcPct val="100000"/>
+              </a:lnSpc>
+              <a:spcBef>
+                <a:spcPct val="0"/>
+              </a:spcBef>
+              <a:buNone/>
+              <a:defRPr sz="5400" kern="1200">
+                <a:solidFill>
+                  <a:schemeClr val="tx1"/>
+                </a:solidFill>
+                <a:latin typeface="+mj-lt"/>
+                <a:ea typeface="+mj-ea"/>
+                <a:cs typeface="+mj-cs"/>
+              </a:defRPr>
+            </a:lvl1pPr>
+          </a:lstStyle>
+          <a:p>
+            <a:pPr algn="ctr"/>
+            <a:endParaRPr lang="fr-FR" sz="2800" dirty="0"/>
+          </a:p>
+        </p:txBody>
+      </p:sp>
+      <p:sp>
+        <p:nvSpPr>
+          <p:cNvPr id="13" name="Titre 1">
+            <a:extLst>
+              <a:ext uri="{FF2B5EF4-FFF2-40B4-BE49-F238E27FC236}">
+                <a16:creationId xmlns:a16="http://schemas.microsoft.com/office/drawing/2014/main" id="{EB9F3328-2FC3-4805-903B-30D6848DBE17}"/>
+              </a:ext>
+            </a:extLst>
+          </p:cNvPr>
+          <p:cNvSpPr txBox="1">
+            <a:spLocks/>
+          </p:cNvSpPr>
+          <p:nvPr/>
+        </p:nvSpPr>
+        <p:spPr>
+          <a:xfrm>
+            <a:off x="4085730" y="4488696"/>
+            <a:ext cx="3878179" cy="1325563"/>
+          </a:xfrm>
+          <a:prstGeom prst="rect">
+            <a:avLst/>
+          </a:prstGeom>
+        </p:spPr>
+        <p:txBody>
+          <a:bodyPr vert="horz" lIns="91440" tIns="45720" rIns="91440" bIns="45720" rtlCol="0" anchor="ctr">
+            <a:normAutofit/>
+          </a:bodyPr>
+          <a:lstStyle>
+            <a:lvl1pPr algn="l" defTabSz="914400" rtl="0" eaLnBrk="1" latinLnBrk="0" hangingPunct="1">
+              <a:lnSpc>
+                <a:spcPct val="100000"/>
+              </a:lnSpc>
+              <a:spcBef>
+                <a:spcPct val="0"/>
+              </a:spcBef>
+              <a:buNone/>
+              <a:defRPr sz="5400" kern="1200">
+                <a:solidFill>
+                  <a:schemeClr val="tx1"/>
+                </a:solidFill>
+                <a:latin typeface="+mj-lt"/>
+                <a:ea typeface="+mj-ea"/>
+                <a:cs typeface="+mj-cs"/>
+              </a:defRPr>
+            </a:lvl1pPr>
+          </a:lstStyle>
+          <a:p>
+            <a:pPr algn="ctr"/>
+            <a:endParaRPr lang="fr-FR" sz="2800" dirty="0"/>
+          </a:p>
+        </p:txBody>
+      </p:sp>
+      <p:sp>
+        <p:nvSpPr>
+          <p:cNvPr id="14" name="Titre 1">
+            <a:extLst>
+              <a:ext uri="{FF2B5EF4-FFF2-40B4-BE49-F238E27FC236}">
+                <a16:creationId xmlns:a16="http://schemas.microsoft.com/office/drawing/2014/main" id="{C55C0BEC-B86B-4A64-9C59-95FB01D1A5C7}"/>
+              </a:ext>
+            </a:extLst>
+          </p:cNvPr>
+          <p:cNvSpPr txBox="1">
+            <a:spLocks/>
+          </p:cNvSpPr>
+          <p:nvPr/>
+        </p:nvSpPr>
+        <p:spPr>
+          <a:xfrm>
+            <a:off x="7650409" y="618879"/>
+            <a:ext cx="3878179" cy="1325563"/>
+          </a:xfrm>
+          <a:prstGeom prst="rect">
+            <a:avLst/>
+          </a:prstGeom>
+        </p:spPr>
+        <p:txBody>
+          <a:bodyPr vert="horz" lIns="91440" tIns="45720" rIns="91440" bIns="45720" rtlCol="0" anchor="ctr">
+            <a:normAutofit/>
+          </a:bodyPr>
+          <a:lstStyle>
+            <a:lvl1pPr algn="l" defTabSz="914400" rtl="0" eaLnBrk="1" latinLnBrk="0" hangingPunct="1">
+              <a:lnSpc>
+                <a:spcPct val="100000"/>
+              </a:lnSpc>
+              <a:spcBef>
+                <a:spcPct val="0"/>
+              </a:spcBef>
+              <a:buNone/>
+              <a:defRPr sz="5400" kern="1200">
+                <a:solidFill>
+                  <a:schemeClr val="tx1"/>
+                </a:solidFill>
+                <a:latin typeface="+mj-lt"/>
+                <a:ea typeface="+mj-ea"/>
+                <a:cs typeface="+mj-cs"/>
+              </a:defRPr>
+            </a:lvl1pPr>
+          </a:lstStyle>
+          <a:p>
+            <a:pPr algn="ctr"/>
+            <a:endParaRPr lang="fr-FR" sz="2800" dirty="0"/>
+          </a:p>
+        </p:txBody>
+      </p:sp>
+      <p:pic>
+        <p:nvPicPr>
+          <p:cNvPr id="20" name="Image 19" descr="Une image contenant texte, intérieur, équipement électronique&#10;&#10;Description générée automatiquement">
+            <a:extLst>
+              <a:ext uri="{FF2B5EF4-FFF2-40B4-BE49-F238E27FC236}">
+                <a16:creationId xmlns:a16="http://schemas.microsoft.com/office/drawing/2014/main" id="{1A278367-495D-4ED5-A969-0CCE79C20D4B}"/>
+              </a:ext>
+            </a:extLst>
+          </p:cNvPr>
+          <p:cNvPicPr>
+            <a:picLocks noChangeAspect="1"/>
+          </p:cNvPicPr>
+          <p:nvPr/>
+        </p:nvPicPr>
+        <p:blipFill>
+          <a:blip r:embed="rId2">
+            <a:extLst>
+              <a:ext uri="{28A0092B-C50C-407E-A947-70E740481C1C}">
+                <a14:useLocalDpi xmlns:a14="http://schemas.microsoft.com/office/drawing/2010/main" val="0"/>
+              </a:ext>
+            </a:extLst>
+          </a:blip>
+          <a:stretch>
+            <a:fillRect/>
+          </a:stretch>
+        </p:blipFill>
+        <p:spPr>
+          <a:xfrm>
+            <a:off x="3991550" y="106591"/>
+            <a:ext cx="3288912" cy="2466685"/>
+          </a:xfrm>
+          <a:prstGeom prst="rect">
+            <a:avLst/>
+          </a:prstGeom>
+        </p:spPr>
+      </p:pic>
+      <p:pic>
+        <p:nvPicPr>
+          <p:cNvPr id="22" name="Image 21">
+            <a:extLst>
+              <a:ext uri="{FF2B5EF4-FFF2-40B4-BE49-F238E27FC236}">
+                <a16:creationId xmlns:a16="http://schemas.microsoft.com/office/drawing/2014/main" id="{75090298-5A6F-4704-A6DA-4635D84D9387}"/>
+              </a:ext>
+            </a:extLst>
+          </p:cNvPr>
+          <p:cNvPicPr>
+            <a:picLocks noChangeAspect="1"/>
+          </p:cNvPicPr>
+          <p:nvPr/>
+        </p:nvPicPr>
+        <p:blipFill>
+          <a:blip r:embed="rId3">
+            <a:extLst>
+              <a:ext uri="{28A0092B-C50C-407E-A947-70E740481C1C}">
+                <a14:useLocalDpi xmlns:a14="http://schemas.microsoft.com/office/drawing/2010/main" val="0"/>
+              </a:ext>
+            </a:extLst>
+          </a:blip>
+          <a:stretch>
+            <a:fillRect/>
+          </a:stretch>
+        </p:blipFill>
+        <p:spPr>
+          <a:xfrm>
+            <a:off x="8125911" y="93025"/>
+            <a:ext cx="3288913" cy="2466685"/>
+          </a:xfrm>
+          <a:prstGeom prst="rect">
+            <a:avLst/>
+          </a:prstGeom>
+        </p:spPr>
+      </p:pic>
+      <p:pic>
+        <p:nvPicPr>
+          <p:cNvPr id="24" name="Image 23" descr="Une image contenant texte&#10;&#10;Description générée automatiquement">
+            <a:extLst>
+              <a:ext uri="{FF2B5EF4-FFF2-40B4-BE49-F238E27FC236}">
+                <a16:creationId xmlns:a16="http://schemas.microsoft.com/office/drawing/2014/main" id="{E593C017-9322-4930-A645-26B52C9A038B}"/>
+              </a:ext>
+            </a:extLst>
+          </p:cNvPr>
+          <p:cNvPicPr>
+            <a:picLocks noChangeAspect="1"/>
+          </p:cNvPicPr>
+          <p:nvPr/>
+        </p:nvPicPr>
+        <p:blipFill>
+          <a:blip r:embed="rId4">
+            <a:extLst>
+              <a:ext uri="{28A0092B-C50C-407E-A947-70E740481C1C}">
+                <a14:useLocalDpi xmlns:a14="http://schemas.microsoft.com/office/drawing/2010/main" val="0"/>
+              </a:ext>
+            </a:extLst>
+          </a:blip>
+          <a:stretch>
+            <a:fillRect/>
+          </a:stretch>
+        </p:blipFill>
+        <p:spPr>
+          <a:xfrm>
+            <a:off x="3857264" y="2630076"/>
+            <a:ext cx="3612920" cy="2032267"/>
+          </a:xfrm>
+          <a:prstGeom prst="rect">
+            <a:avLst/>
+          </a:prstGeom>
+        </p:spPr>
+      </p:pic>
+      <p:pic>
+        <p:nvPicPr>
+          <p:cNvPr id="26" name="Image 25" descr="Une image contenant sport, nageant&#10;&#10;Description générée automatiquement">
+            <a:extLst>
+              <a:ext uri="{FF2B5EF4-FFF2-40B4-BE49-F238E27FC236}">
+                <a16:creationId xmlns:a16="http://schemas.microsoft.com/office/drawing/2014/main" id="{A3CCB1DC-79A5-48FF-9D77-FCC18008E03C}"/>
+              </a:ext>
+            </a:extLst>
+          </p:cNvPr>
+          <p:cNvPicPr>
+            <a:picLocks noChangeAspect="1"/>
+          </p:cNvPicPr>
+          <p:nvPr/>
+        </p:nvPicPr>
+        <p:blipFill>
+          <a:blip r:embed="rId5">
+            <a:extLst>
+              <a:ext uri="{28A0092B-C50C-407E-A947-70E740481C1C}">
+                <a14:useLocalDpi xmlns:a14="http://schemas.microsoft.com/office/drawing/2010/main" val="0"/>
+              </a:ext>
+            </a:extLst>
+          </a:blip>
+          <a:stretch>
+            <a:fillRect/>
+          </a:stretch>
+        </p:blipFill>
+        <p:spPr>
+          <a:xfrm>
+            <a:off x="7963909" y="2630076"/>
+            <a:ext cx="3612920" cy="2032268"/>
+          </a:xfrm>
+          <a:prstGeom prst="rect">
+            <a:avLst/>
+          </a:prstGeom>
+        </p:spPr>
+      </p:pic>
+      <p:pic>
+        <p:nvPicPr>
+          <p:cNvPr id="28" name="Image 27">
+            <a:extLst>
+              <a:ext uri="{FF2B5EF4-FFF2-40B4-BE49-F238E27FC236}">
+                <a16:creationId xmlns:a16="http://schemas.microsoft.com/office/drawing/2014/main" id="{3A137909-3166-41A5-B8F6-12B78BF0A6A7}"/>
+              </a:ext>
+            </a:extLst>
+          </p:cNvPr>
+          <p:cNvPicPr>
+            <a:picLocks noChangeAspect="1"/>
+          </p:cNvPicPr>
+          <p:nvPr/>
+        </p:nvPicPr>
+        <p:blipFill>
+          <a:blip r:embed="rId6">
+            <a:extLst>
+              <a:ext uri="{28A0092B-C50C-407E-A947-70E740481C1C}">
+                <a14:useLocalDpi xmlns:a14="http://schemas.microsoft.com/office/drawing/2010/main" val="0"/>
+              </a:ext>
+            </a:extLst>
+          </a:blip>
+          <a:stretch>
+            <a:fillRect/>
+          </a:stretch>
+        </p:blipFill>
+        <p:spPr>
+          <a:xfrm>
+            <a:off x="7988029" y="4732710"/>
+            <a:ext cx="3564679" cy="2005132"/>
+          </a:xfrm>
+          <a:prstGeom prst="rect">
+            <a:avLst/>
+          </a:prstGeom>
+        </p:spPr>
+      </p:pic>
+      <p:pic>
+        <p:nvPicPr>
+          <p:cNvPr id="30" name="Image 29">
+            <a:extLst>
+              <a:ext uri="{FF2B5EF4-FFF2-40B4-BE49-F238E27FC236}">
+                <a16:creationId xmlns:a16="http://schemas.microsoft.com/office/drawing/2014/main" id="{422ED870-D798-45BB-85FE-B9CBDD9ACE7D}"/>
+              </a:ext>
+            </a:extLst>
+          </p:cNvPr>
+          <p:cNvPicPr>
+            <a:picLocks noChangeAspect="1"/>
+          </p:cNvPicPr>
+          <p:nvPr/>
+        </p:nvPicPr>
+        <p:blipFill>
+          <a:blip r:embed="rId7">
+            <a:extLst>
+              <a:ext uri="{28A0092B-C50C-407E-A947-70E740481C1C}">
+                <a14:useLocalDpi xmlns:a14="http://schemas.microsoft.com/office/drawing/2010/main" val="0"/>
+              </a:ext>
+            </a:extLst>
+          </a:blip>
+          <a:stretch>
+            <a:fillRect/>
+          </a:stretch>
+        </p:blipFill>
+        <p:spPr>
+          <a:xfrm>
+            <a:off x="3855482" y="4719143"/>
+            <a:ext cx="3614702" cy="2032266"/>
+          </a:xfrm>
+          <a:prstGeom prst="rect">
+            <a:avLst/>
+          </a:prstGeom>
+        </p:spPr>
+      </p:pic>
+    </p:spTree>
+    <p:extLst>
+      <p:ext uri="{BB962C8B-B14F-4D97-AF65-F5344CB8AC3E}">
+        <p14:creationId xmlns:p14="http://schemas.microsoft.com/office/powerpoint/2010/main" val="2721008647"/>
+      </p:ext>
+    </p:extLst>
+  </p:cSld>
+  <p:clrMapOvr>
+    <a:masterClrMapping/>
+  </p:clrMapOvr>
+</p:sld>
+</file>
+
+<file path=ppt/slides/slide3.xml><?xml version="1.0" encoding="utf-8"?>
+<p:sld xmlns:a="http://schemas.openxmlformats.org/drawingml/2006/main" xmlns:r="http://schemas.openxmlformats.org/officeDocument/2006/relationships" xmlns:p="http://schemas.openxmlformats.org/presentationml/2006/main">
+  <p:cSld>
     <p:bg>
       <p:bgPr>
         <a:solidFill>
@@ -14765,10 +15344,10 @@
       </p:grpSpPr>
       <p:sp useBgFill="1">
         <p:nvSpPr>
-          <p:cNvPr id="18" name="Rectangle 17">
+          <p:cNvPr id="36" name="Rectangle 35">
             <a:extLst>
               <a:ext uri="{FF2B5EF4-FFF2-40B4-BE49-F238E27FC236}">
-                <a16:creationId xmlns:a16="http://schemas.microsoft.com/office/drawing/2014/main" id="{657F69E0-C4B0-4BEC-A689-4F8D877F05D4}"/>
+                <a16:creationId xmlns:a16="http://schemas.microsoft.com/office/drawing/2014/main" id="{AD35AE2F-5E3A-49D9-8DE1-8A333BA4088E}"/>
               </a:ext>
               <a:ext uri="{C183D7F6-B498-43B3-948B-1728B52AA6E4}">
                 <adec:decorative xmlns:adec="http://schemas.microsoft.com/office/drawing/2017/decorative" val="1"/>
@@ -14839,9 +15418,9 @@
         </p:nvPicPr>
         <p:blipFill rotWithShape="1">
           <a:blip r:embed="rId2">
-            <a:alphaModFix/>
+            <a:alphaModFix amt="50000"/>
           </a:blip>
-          <a:srcRect t="243" r="-1" b="15465"/>
+          <a:srcRect t="244" r="-1" b="15464"/>
           <a:stretch/>
         </p:blipFill>
         <p:spPr>
@@ -14856,10 +15435,58 @@
       </p:pic>
       <p:sp>
         <p:nvSpPr>
-          <p:cNvPr id="20" name="Rectangle 19">
+          <p:cNvPr id="2" name="Titre 1">
             <a:extLst>
               <a:ext uri="{FF2B5EF4-FFF2-40B4-BE49-F238E27FC236}">
-                <a16:creationId xmlns:a16="http://schemas.microsoft.com/office/drawing/2014/main" id="{8F51725E-A483-43B2-A6F2-C44F502FE033}"/>
+                <a16:creationId xmlns:a16="http://schemas.microsoft.com/office/drawing/2014/main" id="{6398F89C-904C-4990-8787-58CA066CAA72}"/>
+              </a:ext>
+            </a:extLst>
+          </p:cNvPr>
+          <p:cNvSpPr>
+            <a:spLocks noGrp="1"/>
+          </p:cNvSpPr>
+          <p:nvPr>
+            <p:ph type="ctrTitle"/>
+          </p:nvPr>
+        </p:nvSpPr>
+        <p:spPr>
+          <a:xfrm>
+            <a:off x="1522476" y="1433259"/>
+            <a:ext cx="9144000" cy="3063240"/>
+          </a:xfrm>
+        </p:spPr>
+        <p:txBody>
+          <a:bodyPr>
+            <a:normAutofit/>
+          </a:bodyPr>
+          <a:lstStyle/>
+          <a:p>
+            <a:pPr algn="ctr">
+              <a:lnSpc>
+                <a:spcPct val="90000"/>
+              </a:lnSpc>
+            </a:pPr>
+            <a:r>
+              <a:rPr lang="fr-FR" sz="5300" dirty="0"/>
+              <a:t>Le genre </a:t>
+            </a:r>
+            <a:r>
+              <a:rPr lang="fr-FR" sz="5300" dirty="0" err="1"/>
+              <a:t>Manic</a:t>
+            </a:r>
+            <a:r>
+              <a:rPr lang="fr-FR" sz="5300" dirty="0"/>
+              <a:t> Shooter est très peu présent sur le marché international malgré la présence de ses codes dans plusieurs jeux actuels</a:t>
+            </a:r>
+          </a:p>
+        </p:txBody>
+      </p:sp>
+      <p:sp>
+        <p:nvSpPr>
+          <p:cNvPr id="38" name="Rectangle 6">
+            <a:extLst>
+              <a:ext uri="{FF2B5EF4-FFF2-40B4-BE49-F238E27FC236}">
+                <a16:creationId xmlns:a16="http://schemas.microsoft.com/office/drawing/2014/main" id="{04D8AD8F-EF7F-481F-B99A-B8513897050A}"/>
               </a:ext>
               <a:ext uri="{C183D7F6-B498-43B3-948B-1728B52AA6E4}">
                 <adec:decorative xmlns:adec="http://schemas.microsoft.com/office/drawing/2017/decorative" val="1"/>
@@ -14879,158 +15506,7 @@
         </p:nvSpPr>
         <p:spPr>
           <a:xfrm>
-            <a:off x="0" y="937549"/>
-            <a:ext cx="12191999" cy="5058137"/>
-          </a:xfrm>
-          <a:prstGeom prst="rect">
-            <a:avLst/>
-          </a:prstGeom>
-          <a:gradFill flip="none" rotWithShape="1">
-            <a:gsLst>
-              <a:gs pos="50000">
-                <a:schemeClr val="tx1">
-                  <a:alpha val="30000"/>
-                </a:schemeClr>
-              </a:gs>
-              <a:gs pos="80000">
-                <a:schemeClr val="tx1">
-                  <a:alpha val="15000"/>
-                </a:schemeClr>
-              </a:gs>
-              <a:gs pos="0">
-                <a:schemeClr val="tx1">
-                  <a:alpha val="0"/>
-                </a:schemeClr>
-              </a:gs>
-              <a:gs pos="20000">
-                <a:schemeClr val="tx1">
-                  <a:alpha val="15000"/>
-                </a:schemeClr>
-              </a:gs>
-              <a:gs pos="100000">
-                <a:schemeClr val="tx1">
-                  <a:alpha val="0"/>
-                </a:schemeClr>
-              </a:gs>
-            </a:gsLst>
-            <a:lin ang="16200000" scaled="1"/>
-            <a:tileRect/>
-          </a:gradFill>
-          <a:ln>
-            <a:noFill/>
-          </a:ln>
-        </p:spPr>
-        <p:style>
-          <a:lnRef idx="2">
-            <a:schemeClr val="accent1">
-              <a:shade val="50000"/>
-            </a:schemeClr>
-          </a:lnRef>
-          <a:fillRef idx="1">
-            <a:schemeClr val="accent1"/>
-          </a:fillRef>
-          <a:effectRef idx="0">
-            <a:schemeClr val="accent1"/>
-          </a:effectRef>
-          <a:fontRef idx="minor">
-            <a:schemeClr val="lt1"/>
-          </a:fontRef>
-        </p:style>
-        <p:txBody>
-          <a:bodyPr rtlCol="0" anchor="ctr"/>
-          <a:lstStyle/>
-          <a:p>
-            <a:pPr algn="ctr"/>
-            <a:endParaRPr lang="en-US"/>
-          </a:p>
-        </p:txBody>
-      </p:sp>
-      <p:sp>
-        <p:nvSpPr>
-          <p:cNvPr id="2" name="Titre 1">
-            <a:extLst>
-              <a:ext uri="{FF2B5EF4-FFF2-40B4-BE49-F238E27FC236}">
-                <a16:creationId xmlns:a16="http://schemas.microsoft.com/office/drawing/2014/main" id="{6398F89C-904C-4990-8787-58CA066CAA72}"/>
-              </a:ext>
-            </a:extLst>
-          </p:cNvPr>
-          <p:cNvSpPr>
-            <a:spLocks noGrp="1"/>
-          </p:cNvSpPr>
-          <p:nvPr>
-            <p:ph type="ctrTitle"/>
-          </p:nvPr>
-        </p:nvSpPr>
-        <p:spPr>
-          <a:xfrm>
-            <a:off x="1522476" y="2837003"/>
-            <a:ext cx="9144000" cy="3063240"/>
-          </a:xfrm>
-        </p:spPr>
-        <p:txBody>
-          <a:bodyPr>
-            <a:normAutofit fontScale="90000"/>
-          </a:bodyPr>
-          <a:lstStyle/>
-          <a:p>
-            <a:pPr algn="ctr">
-              <a:lnSpc>
-                <a:spcPct val="90000"/>
-              </a:lnSpc>
-            </a:pPr>
-            <a:r>
-              <a:rPr lang="fr-FR" sz="10800" dirty="0">
-                <a:solidFill>
-                  <a:schemeClr val="bg1"/>
-                </a:solidFill>
-              </a:rPr>
-              <a:t>Comment remettre au goût du jour le genre </a:t>
-            </a:r>
-            <a:r>
-              <a:rPr lang="fr-FR" sz="10800" dirty="0" err="1">
-                <a:solidFill>
-                  <a:schemeClr val="bg1"/>
-                </a:solidFill>
-              </a:rPr>
-              <a:t>manic</a:t>
-            </a:r>
-            <a:r>
-              <a:rPr lang="fr-FR" sz="10800" dirty="0">
-                <a:solidFill>
-                  <a:schemeClr val="bg1"/>
-                </a:solidFill>
-              </a:rPr>
-              <a:t> shooter vieillissant ?</a:t>
-            </a:r>
-          </a:p>
-        </p:txBody>
-      </p:sp>
-      <p:sp>
-        <p:nvSpPr>
-          <p:cNvPr id="22" name="Rectangle 6">
-            <a:extLst>
-              <a:ext uri="{FF2B5EF4-FFF2-40B4-BE49-F238E27FC236}">
-                <a16:creationId xmlns:a16="http://schemas.microsoft.com/office/drawing/2014/main" id="{9F6380B4-6A1C-481E-8408-B4E6C75B9B81}"/>
-              </a:ext>
-              <a:ext uri="{C183D7F6-B498-43B3-948B-1728B52AA6E4}">
-                <adec:decorative xmlns:adec="http://schemas.microsoft.com/office/drawing/2017/decorative" val="1"/>
-              </a:ext>
-            </a:extLst>
-          </p:cNvPr>
-          <p:cNvSpPr>
-            <a:spLocks noGrp="1" noRot="1" noChangeAspect="1" noMove="1" noResize="1" noEditPoints="1" noAdjustHandles="1" noChangeArrowheads="1" noChangeShapeType="1" noTextEdit="1"/>
-          </p:cNvSpPr>
-          <p:nvPr>
-            <p:extLst>
-              <p:ext uri="{386F3935-93C4-4BCD-93E2-E3B085C9AB24}">
-                <p16:designElem xmlns:p16="http://schemas.microsoft.com/office/powerpoint/2015/main" val="1"/>
-              </p:ext>
-            </p:extLst>
-          </p:nvPr>
-        </p:nvSpPr>
-        <p:spPr>
-          <a:xfrm>
-            <a:off x="3974206" y="4368623"/>
+            <a:off x="3974206" y="4419423"/>
             <a:ext cx="4243589" cy="27432"/>
           </a:xfrm>
           <a:custGeom>
@@ -15302,17 +15778,552 @@
             </a:pathLst>
           </a:custGeom>
           <a:solidFill>
-            <a:schemeClr val="bg1"/>
+            <a:schemeClr val="tx1"/>
           </a:solidFill>
           <a:ln w="38100" cap="rnd">
             <a:solidFill>
-              <a:schemeClr val="bg1"/>
+              <a:schemeClr val="tx1"/>
             </a:solidFill>
             <a:round/>
             <a:extLst>
               <a:ext uri="{C807C97D-BFC1-408E-A445-0C87EB9F89A2}">
                 <ask:lineSketchStyleProps xmlns:ask="http://schemas.microsoft.com/office/drawing/2018/sketchyshapes" sd="1219033472">
                   <a:prstGeom prst="rect">
+                    <a:avLst/>
+                  </a:prstGeom>
+                  <ask:type>
+                    <ask:lineSketchFreehand/>
+                  </ask:type>
+                </ask:lineSketchStyleProps>
+              </a:ext>
+            </a:extLst>
+          </a:ln>
+        </p:spPr>
+        <p:style>
+          <a:lnRef idx="2">
+            <a:schemeClr val="accent1">
+              <a:shade val="50000"/>
+            </a:schemeClr>
+          </a:lnRef>
+          <a:fillRef idx="1">
+            <a:schemeClr val="accent1"/>
+          </a:fillRef>
+          <a:effectRef idx="0">
+            <a:schemeClr val="accent1"/>
+          </a:effectRef>
+          <a:fontRef idx="minor">
+            <a:schemeClr val="lt1"/>
+          </a:fontRef>
+        </p:style>
+        <p:txBody>
+          <a:bodyPr rtlCol="0" anchor="ctr"/>
+          <a:lstStyle/>
+          <a:p>
+            <a:pPr algn="ctr"/>
+            <a:endParaRPr lang="en-US"/>
+          </a:p>
+        </p:txBody>
+      </p:sp>
+      <p:sp>
+        <p:nvSpPr>
+          <p:cNvPr id="40" name="Rectangle 6">
+            <a:extLst>
+              <a:ext uri="{FF2B5EF4-FFF2-40B4-BE49-F238E27FC236}">
+                <a16:creationId xmlns:a16="http://schemas.microsoft.com/office/drawing/2014/main" id="{79EB4626-023C-436D-9F57-9EB46080909D}"/>
+              </a:ext>
+              <a:ext uri="{C183D7F6-B498-43B3-948B-1728B52AA6E4}">
+                <adec:decorative xmlns:adec="http://schemas.microsoft.com/office/drawing/2017/decorative" val="1"/>
+              </a:ext>
+            </a:extLst>
+          </p:cNvPr>
+          <p:cNvSpPr>
+            <a:spLocks noGrp="1" noRot="1" noChangeAspect="1" noMove="1" noResize="1" noEditPoints="1" noAdjustHandles="1" noChangeArrowheads="1" noChangeShapeType="1" noTextEdit="1"/>
+          </p:cNvSpPr>
+          <p:nvPr>
+            <p:extLst>
+              <p:ext uri="{386F3935-93C4-4BCD-93E2-E3B085C9AB24}">
+                <p16:designElem xmlns:p16="http://schemas.microsoft.com/office/powerpoint/2015/main" val="1"/>
+              </p:ext>
+            </p:extLst>
+          </p:nvPr>
+        </p:nvSpPr>
+        <p:spPr>
+          <a:xfrm flipV="1">
+            <a:off x="838200" y="720953"/>
+            <a:ext cx="10515600" cy="5416094"/>
+          </a:xfrm>
+          <a:custGeom>
+            <a:avLst/>
+            <a:gdLst>
+              <a:gd name="connsiteX0" fmla="*/ 0 w 10515600"/>
+              <a:gd name="connsiteY0" fmla="*/ 902700 h 5416094"/>
+              <a:gd name="connsiteX1" fmla="*/ 902700 w 10515600"/>
+              <a:gd name="connsiteY1" fmla="*/ 0 h 5416094"/>
+              <a:gd name="connsiteX2" fmla="*/ 1746919 w 10515600"/>
+              <a:gd name="connsiteY2" fmla="*/ 0 h 5416094"/>
+              <a:gd name="connsiteX3" fmla="*/ 2329833 w 10515600"/>
+              <a:gd name="connsiteY3" fmla="*/ 0 h 5416094"/>
+              <a:gd name="connsiteX4" fmla="*/ 2825644 w 10515600"/>
+              <a:gd name="connsiteY4" fmla="*/ 0 h 5416094"/>
+              <a:gd name="connsiteX5" fmla="*/ 3582762 w 10515600"/>
+              <a:gd name="connsiteY5" fmla="*/ 0 h 5416094"/>
+              <a:gd name="connsiteX6" fmla="*/ 4165675 w 10515600"/>
+              <a:gd name="connsiteY6" fmla="*/ 0 h 5416094"/>
+              <a:gd name="connsiteX7" fmla="*/ 5009894 w 10515600"/>
+              <a:gd name="connsiteY7" fmla="*/ 0 h 5416094"/>
+              <a:gd name="connsiteX8" fmla="*/ 5505706 w 10515600"/>
+              <a:gd name="connsiteY8" fmla="*/ 0 h 5416094"/>
+              <a:gd name="connsiteX9" fmla="*/ 6349925 w 10515600"/>
+              <a:gd name="connsiteY9" fmla="*/ 0 h 5416094"/>
+              <a:gd name="connsiteX10" fmla="*/ 6758634 w 10515600"/>
+              <a:gd name="connsiteY10" fmla="*/ 0 h 5416094"/>
+              <a:gd name="connsiteX11" fmla="*/ 7428650 w 10515600"/>
+              <a:gd name="connsiteY11" fmla="*/ 0 h 5416094"/>
+              <a:gd name="connsiteX12" fmla="*/ 8098665 w 10515600"/>
+              <a:gd name="connsiteY12" fmla="*/ 0 h 5416094"/>
+              <a:gd name="connsiteX13" fmla="*/ 8681579 w 10515600"/>
+              <a:gd name="connsiteY13" fmla="*/ 0 h 5416094"/>
+              <a:gd name="connsiteX14" fmla="*/ 9612900 w 10515600"/>
+              <a:gd name="connsiteY14" fmla="*/ 0 h 5416094"/>
+              <a:gd name="connsiteX15" fmla="*/ 10515600 w 10515600"/>
+              <a:gd name="connsiteY15" fmla="*/ 902700 h 5416094"/>
+              <a:gd name="connsiteX16" fmla="*/ 10515600 w 10515600"/>
+              <a:gd name="connsiteY16" fmla="*/ 1504482 h 5416094"/>
+              <a:gd name="connsiteX17" fmla="*/ 10515600 w 10515600"/>
+              <a:gd name="connsiteY17" fmla="*/ 2178479 h 5416094"/>
+              <a:gd name="connsiteX18" fmla="*/ 10515600 w 10515600"/>
+              <a:gd name="connsiteY18" fmla="*/ 2780261 h 5416094"/>
+              <a:gd name="connsiteX19" fmla="*/ 10515600 w 10515600"/>
+              <a:gd name="connsiteY19" fmla="*/ 3273722 h 5416094"/>
+              <a:gd name="connsiteX20" fmla="*/ 10515600 w 10515600"/>
+              <a:gd name="connsiteY20" fmla="*/ 3803291 h 5416094"/>
+              <a:gd name="connsiteX21" fmla="*/ 10515600 w 10515600"/>
+              <a:gd name="connsiteY21" fmla="*/ 4513394 h 5416094"/>
+              <a:gd name="connsiteX22" fmla="*/ 9612900 w 10515600"/>
+              <a:gd name="connsiteY22" fmla="*/ 5416094 h 5416094"/>
+              <a:gd name="connsiteX23" fmla="*/ 9117089 w 10515600"/>
+              <a:gd name="connsiteY23" fmla="*/ 5416094 h 5416094"/>
+              <a:gd name="connsiteX24" fmla="*/ 8708379 w 10515600"/>
+              <a:gd name="connsiteY24" fmla="*/ 5416094 h 5416094"/>
+              <a:gd name="connsiteX25" fmla="*/ 8299670 w 10515600"/>
+              <a:gd name="connsiteY25" fmla="*/ 5416094 h 5416094"/>
+              <a:gd name="connsiteX26" fmla="*/ 7629654 w 10515600"/>
+              <a:gd name="connsiteY26" fmla="*/ 5416094 h 5416094"/>
+              <a:gd name="connsiteX27" fmla="*/ 7133843 w 10515600"/>
+              <a:gd name="connsiteY27" fmla="*/ 5416094 h 5416094"/>
+              <a:gd name="connsiteX28" fmla="*/ 6376726 w 10515600"/>
+              <a:gd name="connsiteY28" fmla="*/ 5416094 h 5416094"/>
+              <a:gd name="connsiteX29" fmla="*/ 5880914 w 10515600"/>
+              <a:gd name="connsiteY29" fmla="*/ 5416094 h 5416094"/>
+              <a:gd name="connsiteX30" fmla="*/ 5123797 w 10515600"/>
+              <a:gd name="connsiteY30" fmla="*/ 5416094 h 5416094"/>
+              <a:gd name="connsiteX31" fmla="*/ 4715088 w 10515600"/>
+              <a:gd name="connsiteY31" fmla="*/ 5416094 h 5416094"/>
+              <a:gd name="connsiteX32" fmla="*/ 3957970 w 10515600"/>
+              <a:gd name="connsiteY32" fmla="*/ 5416094 h 5416094"/>
+              <a:gd name="connsiteX33" fmla="*/ 3462159 w 10515600"/>
+              <a:gd name="connsiteY33" fmla="*/ 5416094 h 5416094"/>
+              <a:gd name="connsiteX34" fmla="*/ 3053449 w 10515600"/>
+              <a:gd name="connsiteY34" fmla="*/ 5416094 h 5416094"/>
+              <a:gd name="connsiteX35" fmla="*/ 2557638 w 10515600"/>
+              <a:gd name="connsiteY35" fmla="*/ 5416094 h 5416094"/>
+              <a:gd name="connsiteX36" fmla="*/ 1800521 w 10515600"/>
+              <a:gd name="connsiteY36" fmla="*/ 5416094 h 5416094"/>
+              <a:gd name="connsiteX37" fmla="*/ 902700 w 10515600"/>
+              <a:gd name="connsiteY37" fmla="*/ 5416094 h 5416094"/>
+              <a:gd name="connsiteX38" fmla="*/ 0 w 10515600"/>
+              <a:gd name="connsiteY38" fmla="*/ 4513394 h 5416094"/>
+              <a:gd name="connsiteX39" fmla="*/ 0 w 10515600"/>
+              <a:gd name="connsiteY39" fmla="*/ 3911612 h 5416094"/>
+              <a:gd name="connsiteX40" fmla="*/ 0 w 10515600"/>
+              <a:gd name="connsiteY40" fmla="*/ 3309829 h 5416094"/>
+              <a:gd name="connsiteX41" fmla="*/ 0 w 10515600"/>
+              <a:gd name="connsiteY41" fmla="*/ 2780261 h 5416094"/>
+              <a:gd name="connsiteX42" fmla="*/ 0 w 10515600"/>
+              <a:gd name="connsiteY42" fmla="*/ 2106265 h 5416094"/>
+              <a:gd name="connsiteX43" fmla="*/ 0 w 10515600"/>
+              <a:gd name="connsiteY43" fmla="*/ 1504482 h 5416094"/>
+              <a:gd name="connsiteX44" fmla="*/ 0 w 10515600"/>
+              <a:gd name="connsiteY44" fmla="*/ 902700 h 5416094"/>
+            </a:gdLst>
+            <a:ahLst/>
+            <a:cxnLst>
+              <a:cxn ang="0">
+                <a:pos x="connsiteX0" y="connsiteY0"/>
+              </a:cxn>
+              <a:cxn ang="0">
+                <a:pos x="connsiteX1" y="connsiteY1"/>
+              </a:cxn>
+              <a:cxn ang="0">
+                <a:pos x="connsiteX2" y="connsiteY2"/>
+              </a:cxn>
+              <a:cxn ang="0">
+                <a:pos x="connsiteX3" y="connsiteY3"/>
+              </a:cxn>
+              <a:cxn ang="0">
+                <a:pos x="connsiteX4" y="connsiteY4"/>
+              </a:cxn>
+              <a:cxn ang="0">
+                <a:pos x="connsiteX5" y="connsiteY5"/>
+              </a:cxn>
+              <a:cxn ang="0">
+                <a:pos x="connsiteX6" y="connsiteY6"/>
+              </a:cxn>
+              <a:cxn ang="0">
+                <a:pos x="connsiteX7" y="connsiteY7"/>
+              </a:cxn>
+              <a:cxn ang="0">
+                <a:pos x="connsiteX8" y="connsiteY8"/>
+              </a:cxn>
+              <a:cxn ang="0">
+                <a:pos x="connsiteX9" y="connsiteY9"/>
+              </a:cxn>
+              <a:cxn ang="0">
+                <a:pos x="connsiteX10" y="connsiteY10"/>
+              </a:cxn>
+              <a:cxn ang="0">
+                <a:pos x="connsiteX11" y="connsiteY11"/>
+              </a:cxn>
+              <a:cxn ang="0">
+                <a:pos x="connsiteX12" y="connsiteY12"/>
+              </a:cxn>
+              <a:cxn ang="0">
+                <a:pos x="connsiteX13" y="connsiteY13"/>
+              </a:cxn>
+              <a:cxn ang="0">
+                <a:pos x="connsiteX14" y="connsiteY14"/>
+              </a:cxn>
+              <a:cxn ang="0">
+                <a:pos x="connsiteX15" y="connsiteY15"/>
+              </a:cxn>
+              <a:cxn ang="0">
+                <a:pos x="connsiteX16" y="connsiteY16"/>
+              </a:cxn>
+              <a:cxn ang="0">
+                <a:pos x="connsiteX17" y="connsiteY17"/>
+              </a:cxn>
+              <a:cxn ang="0">
+                <a:pos x="connsiteX18" y="connsiteY18"/>
+              </a:cxn>
+              <a:cxn ang="0">
+                <a:pos x="connsiteX19" y="connsiteY19"/>
+              </a:cxn>
+              <a:cxn ang="0">
+                <a:pos x="connsiteX20" y="connsiteY20"/>
+              </a:cxn>
+              <a:cxn ang="0">
+                <a:pos x="connsiteX21" y="connsiteY21"/>
+              </a:cxn>
+              <a:cxn ang="0">
+                <a:pos x="connsiteX22" y="connsiteY22"/>
+              </a:cxn>
+              <a:cxn ang="0">
+                <a:pos x="connsiteX23" y="connsiteY23"/>
+              </a:cxn>
+              <a:cxn ang="0">
+                <a:pos x="connsiteX24" y="connsiteY24"/>
+              </a:cxn>
+              <a:cxn ang="0">
+                <a:pos x="connsiteX25" y="connsiteY25"/>
+              </a:cxn>
+              <a:cxn ang="0">
+                <a:pos x="connsiteX26" y="connsiteY26"/>
+              </a:cxn>
+              <a:cxn ang="0">
+                <a:pos x="connsiteX27" y="connsiteY27"/>
+              </a:cxn>
+              <a:cxn ang="0">
+                <a:pos x="connsiteX28" y="connsiteY28"/>
+              </a:cxn>
+              <a:cxn ang="0">
+                <a:pos x="connsiteX29" y="connsiteY29"/>
+              </a:cxn>
+              <a:cxn ang="0">
+                <a:pos x="connsiteX30" y="connsiteY30"/>
+              </a:cxn>
+              <a:cxn ang="0">
+                <a:pos x="connsiteX31" y="connsiteY31"/>
+              </a:cxn>
+              <a:cxn ang="0">
+                <a:pos x="connsiteX32" y="connsiteY32"/>
+              </a:cxn>
+              <a:cxn ang="0">
+                <a:pos x="connsiteX33" y="connsiteY33"/>
+              </a:cxn>
+              <a:cxn ang="0">
+                <a:pos x="connsiteX34" y="connsiteY34"/>
+              </a:cxn>
+              <a:cxn ang="0">
+                <a:pos x="connsiteX35" y="connsiteY35"/>
+              </a:cxn>
+              <a:cxn ang="0">
+                <a:pos x="connsiteX36" y="connsiteY36"/>
+              </a:cxn>
+              <a:cxn ang="0">
+                <a:pos x="connsiteX37" y="connsiteY37"/>
+              </a:cxn>
+              <a:cxn ang="0">
+                <a:pos x="connsiteX38" y="connsiteY38"/>
+              </a:cxn>
+              <a:cxn ang="0">
+                <a:pos x="connsiteX39" y="connsiteY39"/>
+              </a:cxn>
+              <a:cxn ang="0">
+                <a:pos x="connsiteX40" y="connsiteY40"/>
+              </a:cxn>
+              <a:cxn ang="0">
+                <a:pos x="connsiteX41" y="connsiteY41"/>
+              </a:cxn>
+              <a:cxn ang="0">
+                <a:pos x="connsiteX42" y="connsiteY42"/>
+              </a:cxn>
+              <a:cxn ang="0">
+                <a:pos x="connsiteX43" y="connsiteY43"/>
+              </a:cxn>
+              <a:cxn ang="0">
+                <a:pos x="connsiteX44" y="connsiteY44"/>
+              </a:cxn>
+            </a:cxnLst>
+            <a:rect l="l" t="t" r="r" b="b"/>
+            <a:pathLst>
+              <a:path w="10515600" h="5416094" extrusionOk="0">
+                <a:moveTo>
+                  <a:pt x="0" y="902700"/>
+                </a:moveTo>
+                <a:cubicBezTo>
+                  <a:pt x="-57306" y="368805"/>
+                  <a:pt x="305054" y="37193"/>
+                  <a:pt x="902700" y="0"/>
+                </a:cubicBezTo>
+                <a:cubicBezTo>
+                  <a:pt x="1280419" y="-35006"/>
+                  <a:pt x="1407743" y="-35339"/>
+                  <a:pt x="1746919" y="0"/>
+                </a:cubicBezTo>
+                <a:cubicBezTo>
+                  <a:pt x="2086095" y="35339"/>
+                  <a:pt x="2146539" y="-12333"/>
+                  <a:pt x="2329833" y="0"/>
+                </a:cubicBezTo>
+                <a:cubicBezTo>
+                  <a:pt x="2513127" y="12333"/>
+                  <a:pt x="2706706" y="12952"/>
+                  <a:pt x="2825644" y="0"/>
+                </a:cubicBezTo>
+                <a:cubicBezTo>
+                  <a:pt x="2944582" y="-12952"/>
+                  <a:pt x="3420817" y="-27100"/>
+                  <a:pt x="3582762" y="0"/>
+                </a:cubicBezTo>
+                <a:cubicBezTo>
+                  <a:pt x="3744707" y="27100"/>
+                  <a:pt x="4023584" y="-9167"/>
+                  <a:pt x="4165675" y="0"/>
+                </a:cubicBezTo>
+                <a:cubicBezTo>
+                  <a:pt x="4307766" y="9167"/>
+                  <a:pt x="4770188" y="27031"/>
+                  <a:pt x="5009894" y="0"/>
+                </a:cubicBezTo>
+                <a:cubicBezTo>
+                  <a:pt x="5249600" y="-27031"/>
+                  <a:pt x="5349881" y="-194"/>
+                  <a:pt x="5505706" y="0"/>
+                </a:cubicBezTo>
+                <a:cubicBezTo>
+                  <a:pt x="5661531" y="194"/>
+                  <a:pt x="6129254" y="-29363"/>
+                  <a:pt x="6349925" y="0"/>
+                </a:cubicBezTo>
+                <a:cubicBezTo>
+                  <a:pt x="6570596" y="29363"/>
+                  <a:pt x="6581199" y="-14617"/>
+                  <a:pt x="6758634" y="0"/>
+                </a:cubicBezTo>
+                <a:cubicBezTo>
+                  <a:pt x="6936069" y="14617"/>
+                  <a:pt x="7246491" y="25675"/>
+                  <a:pt x="7428650" y="0"/>
+                </a:cubicBezTo>
+                <a:cubicBezTo>
+                  <a:pt x="7610809" y="-25675"/>
+                  <a:pt x="7825190" y="-17078"/>
+                  <a:pt x="8098665" y="0"/>
+                </a:cubicBezTo>
+                <a:cubicBezTo>
+                  <a:pt x="8372141" y="17078"/>
+                  <a:pt x="8559625" y="-21568"/>
+                  <a:pt x="8681579" y="0"/>
+                </a:cubicBezTo>
+                <a:cubicBezTo>
+                  <a:pt x="8803533" y="21568"/>
+                  <a:pt x="9307226" y="-46066"/>
+                  <a:pt x="9612900" y="0"/>
+                </a:cubicBezTo>
+                <a:cubicBezTo>
+                  <a:pt x="10119954" y="-10560"/>
+                  <a:pt x="10418674" y="366684"/>
+                  <a:pt x="10515600" y="902700"/>
+                </a:cubicBezTo>
+                <a:cubicBezTo>
+                  <a:pt x="10494548" y="1140809"/>
+                  <a:pt x="10524881" y="1252168"/>
+                  <a:pt x="10515600" y="1504482"/>
+                </a:cubicBezTo>
+                <a:cubicBezTo>
+                  <a:pt x="10506319" y="1756796"/>
+                  <a:pt x="10494309" y="1995078"/>
+                  <a:pt x="10515600" y="2178479"/>
+                </a:cubicBezTo>
+                <a:cubicBezTo>
+                  <a:pt x="10536891" y="2361880"/>
+                  <a:pt x="10522845" y="2487483"/>
+                  <a:pt x="10515600" y="2780261"/>
+                </a:cubicBezTo>
+                <a:cubicBezTo>
+                  <a:pt x="10508355" y="3073039"/>
+                  <a:pt x="10533694" y="3138252"/>
+                  <a:pt x="10515600" y="3273722"/>
+                </a:cubicBezTo>
+                <a:cubicBezTo>
+                  <a:pt x="10497506" y="3409192"/>
+                  <a:pt x="10514952" y="3569910"/>
+                  <a:pt x="10515600" y="3803291"/>
+                </a:cubicBezTo>
+                <a:cubicBezTo>
+                  <a:pt x="10516248" y="4036672"/>
+                  <a:pt x="10499126" y="4317688"/>
+                  <a:pt x="10515600" y="4513394"/>
+                </a:cubicBezTo>
+                <a:cubicBezTo>
+                  <a:pt x="10585499" y="4997151"/>
+                  <a:pt x="10115437" y="5453981"/>
+                  <a:pt x="9612900" y="5416094"/>
+                </a:cubicBezTo>
+                <a:cubicBezTo>
+                  <a:pt x="9473271" y="5418358"/>
+                  <a:pt x="9316384" y="5423764"/>
+                  <a:pt x="9117089" y="5416094"/>
+                </a:cubicBezTo>
+                <a:cubicBezTo>
+                  <a:pt x="8917794" y="5408424"/>
+                  <a:pt x="8902141" y="5433256"/>
+                  <a:pt x="8708379" y="5416094"/>
+                </a:cubicBezTo>
+                <a:cubicBezTo>
+                  <a:pt x="8514617" y="5398933"/>
+                  <a:pt x="8454700" y="5422387"/>
+                  <a:pt x="8299670" y="5416094"/>
+                </a:cubicBezTo>
+                <a:cubicBezTo>
+                  <a:pt x="8144640" y="5409801"/>
+                  <a:pt x="7907022" y="5398388"/>
+                  <a:pt x="7629654" y="5416094"/>
+                </a:cubicBezTo>
+                <a:cubicBezTo>
+                  <a:pt x="7352286" y="5433800"/>
+                  <a:pt x="7244777" y="5409877"/>
+                  <a:pt x="7133843" y="5416094"/>
+                </a:cubicBezTo>
+                <a:cubicBezTo>
+                  <a:pt x="7022909" y="5422311"/>
+                  <a:pt x="6748865" y="5379753"/>
+                  <a:pt x="6376726" y="5416094"/>
+                </a:cubicBezTo>
+                <a:cubicBezTo>
+                  <a:pt x="6004587" y="5452435"/>
+                  <a:pt x="5991442" y="5438860"/>
+                  <a:pt x="5880914" y="5416094"/>
+                </a:cubicBezTo>
+                <a:cubicBezTo>
+                  <a:pt x="5770386" y="5393328"/>
+                  <a:pt x="5294303" y="5440618"/>
+                  <a:pt x="5123797" y="5416094"/>
+                </a:cubicBezTo>
+                <a:cubicBezTo>
+                  <a:pt x="4953291" y="5391570"/>
+                  <a:pt x="4828705" y="5430421"/>
+                  <a:pt x="4715088" y="5416094"/>
+                </a:cubicBezTo>
+                <a:cubicBezTo>
+                  <a:pt x="4601471" y="5401767"/>
+                  <a:pt x="4227806" y="5381491"/>
+                  <a:pt x="3957970" y="5416094"/>
+                </a:cubicBezTo>
+                <a:cubicBezTo>
+                  <a:pt x="3688134" y="5450697"/>
+                  <a:pt x="3670638" y="5425309"/>
+                  <a:pt x="3462159" y="5416094"/>
+                </a:cubicBezTo>
+                <a:cubicBezTo>
+                  <a:pt x="3253680" y="5406879"/>
+                  <a:pt x="3167443" y="5432031"/>
+                  <a:pt x="3053449" y="5416094"/>
+                </a:cubicBezTo>
+                <a:cubicBezTo>
+                  <a:pt x="2939455" y="5400158"/>
+                  <a:pt x="2701485" y="5433995"/>
+                  <a:pt x="2557638" y="5416094"/>
+                </a:cubicBezTo>
+                <a:cubicBezTo>
+                  <a:pt x="2413791" y="5398193"/>
+                  <a:pt x="2168647" y="5424510"/>
+                  <a:pt x="1800521" y="5416094"/>
+                </a:cubicBezTo>
+                <a:cubicBezTo>
+                  <a:pt x="1432395" y="5407678"/>
+                  <a:pt x="1261364" y="5454497"/>
+                  <a:pt x="902700" y="5416094"/>
+                </a:cubicBezTo>
+                <a:cubicBezTo>
+                  <a:pt x="519468" y="5419760"/>
+                  <a:pt x="63003" y="5077223"/>
+                  <a:pt x="0" y="4513394"/>
+                </a:cubicBezTo>
+                <a:cubicBezTo>
+                  <a:pt x="-20265" y="4243495"/>
+                  <a:pt x="27650" y="4053844"/>
+                  <a:pt x="0" y="3911612"/>
+                </a:cubicBezTo>
+                <a:cubicBezTo>
+                  <a:pt x="-27650" y="3769380"/>
+                  <a:pt x="24988" y="3469350"/>
+                  <a:pt x="0" y="3309829"/>
+                </a:cubicBezTo>
+                <a:cubicBezTo>
+                  <a:pt x="-24988" y="3150308"/>
+                  <a:pt x="-16973" y="2933511"/>
+                  <a:pt x="0" y="2780261"/>
+                </a:cubicBezTo>
+                <a:cubicBezTo>
+                  <a:pt x="16973" y="2627011"/>
+                  <a:pt x="-11552" y="2315258"/>
+                  <a:pt x="0" y="2106265"/>
+                </a:cubicBezTo>
+                <a:cubicBezTo>
+                  <a:pt x="11552" y="1897272"/>
+                  <a:pt x="-9167" y="1726905"/>
+                  <a:pt x="0" y="1504482"/>
+                </a:cubicBezTo>
+                <a:cubicBezTo>
+                  <a:pt x="9167" y="1282059"/>
+                  <a:pt x="10972" y="1160784"/>
+                  <a:pt x="0" y="902700"/>
+                </a:cubicBezTo>
+                <a:close/>
+              </a:path>
+            </a:pathLst>
+          </a:custGeom>
+          <a:noFill/>
+          <a:ln w="60325" cap="rnd">
+            <a:solidFill>
+              <a:schemeClr val="tx1"/>
+            </a:solidFill>
+            <a:round/>
+            <a:extLst>
+              <a:ext uri="{C807C97D-BFC1-408E-A445-0C87EB9F89A2}">
+                <ask:lineSketchStyleProps xmlns:ask="http://schemas.microsoft.com/office/drawing/2018/sketchyshapes" sd="1219033472">
+                  <a:prstGeom prst="roundRect">
                     <a:avLst/>
                   </a:prstGeom>
                   <ask:type>
@@ -15356,7 +16367,7 @@
     </p:extLst>
   </p:cSld>
   <p:clrMapOvr>
-    <a:masterClrMapping/>
+    <a:overrideClrMapping bg1="dk1" tx1="lt1" bg2="dk2" tx2="lt2" accent1="accent1" accent2="accent2" accent3="accent3" accent4="accent4" accent5="accent5" accent6="accent6" hlink="hlink" folHlink="folHlink"/>
   </p:clrMapOvr>
   <p:timing>
     <p:tnLst>
@@ -15491,587 +16502,6 @@
 </p:sld>
 </file>
 
-<file path=ppt/slides/slide3.xml><?xml version="1.0" encoding="utf-8"?>
-<p:sld xmlns:a="http://schemas.openxmlformats.org/drawingml/2006/main" xmlns:r="http://schemas.openxmlformats.org/officeDocument/2006/relationships" xmlns:p="http://schemas.openxmlformats.org/presentationml/2006/main">
-  <p:cSld>
-    <p:spTree>
-      <p:nvGrpSpPr>
-        <p:cNvPr id="1" name=""/>
-        <p:cNvGrpSpPr/>
-        <p:nvPr/>
-      </p:nvGrpSpPr>
-      <p:grpSpPr>
-        <a:xfrm>
-          <a:off x="0" y="0"/>
-          <a:ext cx="0" cy="0"/>
-          <a:chOff x="0" y="0"/>
-          <a:chExt cx="0" cy="0"/>
-        </a:xfrm>
-      </p:grpSpPr>
-      <p:sp>
-        <p:nvSpPr>
-          <p:cNvPr id="18" name="Espace réservé du contenu 17">
-            <a:extLst>
-              <a:ext uri="{FF2B5EF4-FFF2-40B4-BE49-F238E27FC236}">
-                <a16:creationId xmlns:a16="http://schemas.microsoft.com/office/drawing/2014/main" id="{BDB7BE19-6890-44A2-A760-9137CEAF5FD0}"/>
-              </a:ext>
-            </a:extLst>
-          </p:cNvPr>
-          <p:cNvSpPr>
-            <a:spLocks noGrp="1"/>
-          </p:cNvSpPr>
-          <p:nvPr>
-            <p:ph idx="4294967295"/>
-          </p:nvPr>
-        </p:nvSpPr>
-        <p:spPr>
-          <a:xfrm>
-            <a:off x="0" y="0"/>
-            <a:ext cx="3878178" cy="6857999"/>
-          </a:xfrm>
-        </p:spPr>
-        <p:txBody>
-          <a:bodyPr>
-            <a:normAutofit/>
-          </a:bodyPr>
-          <a:lstStyle/>
-          <a:p>
-            <a:pPr algn="ctr">
-              <a:lnSpc>
-                <a:spcPct val="150000"/>
-              </a:lnSpc>
-            </a:pPr>
-            <a:r>
-              <a:rPr lang="fr-FR" sz="4400" dirty="0" err="1"/>
-              <a:t>SpaceWar</a:t>
-            </a:r>
-            <a:r>
-              <a:rPr lang="fr-FR" sz="4400" dirty="0"/>
-              <a:t>! 1962</a:t>
-            </a:r>
-          </a:p>
-          <a:p>
-            <a:pPr algn="ctr">
-              <a:lnSpc>
-                <a:spcPct val="150000"/>
-              </a:lnSpc>
-            </a:pPr>
-            <a:r>
-              <a:rPr lang="fr-FR" sz="4400" dirty="0" err="1"/>
-              <a:t>Space</a:t>
-            </a:r>
-            <a:r>
-              <a:rPr lang="fr-FR" sz="4400" dirty="0"/>
-              <a:t> </a:t>
-            </a:r>
-            <a:r>
-              <a:rPr lang="fr-FR" sz="4400" dirty="0" err="1"/>
-              <a:t>Invaders</a:t>
-            </a:r>
-            <a:r>
-              <a:rPr lang="fr-FR" sz="4400" dirty="0"/>
-              <a:t> 1978</a:t>
-            </a:r>
-          </a:p>
-          <a:p>
-            <a:pPr algn="ctr">
-              <a:lnSpc>
-                <a:spcPct val="150000"/>
-              </a:lnSpc>
-            </a:pPr>
-            <a:r>
-              <a:rPr lang="fr-FR" sz="4400" dirty="0" err="1"/>
-              <a:t>Ikaruga</a:t>
-            </a:r>
-            <a:r>
-              <a:rPr lang="fr-FR" sz="4400" dirty="0"/>
-              <a:t> 2001</a:t>
-            </a:r>
-          </a:p>
-          <a:p>
-            <a:pPr algn="ctr">
-              <a:lnSpc>
-                <a:spcPct val="150000"/>
-              </a:lnSpc>
-            </a:pPr>
-            <a:r>
-              <a:rPr lang="fr-FR" sz="4400" dirty="0" err="1"/>
-              <a:t>Gradius</a:t>
-            </a:r>
-            <a:r>
-              <a:rPr lang="fr-FR" sz="4400" dirty="0"/>
-              <a:t> V 2004</a:t>
-            </a:r>
-          </a:p>
-          <a:p>
-            <a:pPr algn="ctr">
-              <a:lnSpc>
-                <a:spcPct val="150000"/>
-              </a:lnSpc>
-            </a:pPr>
-            <a:r>
-              <a:rPr lang="fr-FR" sz="4400" dirty="0" err="1"/>
-              <a:t>Nier:Automata</a:t>
-            </a:r>
-            <a:r>
-              <a:rPr lang="fr-FR" sz="4400" dirty="0"/>
-              <a:t> 2017</a:t>
-            </a:r>
-          </a:p>
-          <a:p>
-            <a:pPr algn="ctr">
-              <a:lnSpc>
-                <a:spcPct val="150000"/>
-              </a:lnSpc>
-            </a:pPr>
-            <a:r>
-              <a:rPr lang="fr-FR" sz="4400" dirty="0" err="1"/>
-              <a:t>Returnal</a:t>
-            </a:r>
-            <a:r>
-              <a:rPr lang="fr-FR" sz="4400" dirty="0"/>
-              <a:t> 2021</a:t>
-            </a:r>
-          </a:p>
-        </p:txBody>
-      </p:sp>
-      <p:sp>
-        <p:nvSpPr>
-          <p:cNvPr id="9" name="Titre 1">
-            <a:extLst>
-              <a:ext uri="{FF2B5EF4-FFF2-40B4-BE49-F238E27FC236}">
-                <a16:creationId xmlns:a16="http://schemas.microsoft.com/office/drawing/2014/main" id="{2DFF482D-3FC5-45EB-94F6-7050A003901B}"/>
-              </a:ext>
-            </a:extLst>
-          </p:cNvPr>
-          <p:cNvSpPr txBox="1">
-            <a:spLocks/>
-          </p:cNvSpPr>
-          <p:nvPr/>
-        </p:nvSpPr>
-        <p:spPr>
-          <a:xfrm>
-            <a:off x="7650410" y="390292"/>
-            <a:ext cx="2987180" cy="1325563"/>
-          </a:xfrm>
-          <a:prstGeom prst="rect">
-            <a:avLst/>
-          </a:prstGeom>
-        </p:spPr>
-        <p:txBody>
-          <a:bodyPr vert="horz" lIns="91440" tIns="45720" rIns="91440" bIns="45720" rtlCol="0" anchor="ctr">
-            <a:normAutofit/>
-          </a:bodyPr>
-          <a:lstStyle>
-            <a:lvl1pPr algn="l" defTabSz="914400" rtl="0" eaLnBrk="1" latinLnBrk="0" hangingPunct="1">
-              <a:lnSpc>
-                <a:spcPct val="100000"/>
-              </a:lnSpc>
-              <a:spcBef>
-                <a:spcPct val="0"/>
-              </a:spcBef>
-              <a:buNone/>
-              <a:defRPr sz="5400" kern="1200">
-                <a:solidFill>
-                  <a:schemeClr val="tx1"/>
-                </a:solidFill>
-                <a:latin typeface="+mj-lt"/>
-                <a:ea typeface="+mj-ea"/>
-                <a:cs typeface="+mj-cs"/>
-              </a:defRPr>
-            </a:lvl1pPr>
-          </a:lstStyle>
-          <a:p>
-            <a:pPr algn="ctr"/>
-            <a:endParaRPr lang="fr-FR" sz="2800" dirty="0"/>
-          </a:p>
-        </p:txBody>
-      </p:sp>
-      <p:sp>
-        <p:nvSpPr>
-          <p:cNvPr id="10" name="Titre 1">
-            <a:extLst>
-              <a:ext uri="{FF2B5EF4-FFF2-40B4-BE49-F238E27FC236}">
-                <a16:creationId xmlns:a16="http://schemas.microsoft.com/office/drawing/2014/main" id="{207B1B70-16E8-4B2D-82F5-D97D77D736D4}"/>
-              </a:ext>
-            </a:extLst>
-          </p:cNvPr>
-          <p:cNvSpPr txBox="1">
-            <a:spLocks/>
-          </p:cNvSpPr>
-          <p:nvPr/>
-        </p:nvSpPr>
-        <p:spPr>
-          <a:xfrm>
-            <a:off x="3784781" y="2337316"/>
-            <a:ext cx="2987180" cy="1325563"/>
-          </a:xfrm>
-          <a:prstGeom prst="rect">
-            <a:avLst/>
-          </a:prstGeom>
-        </p:spPr>
-        <p:txBody>
-          <a:bodyPr vert="horz" lIns="91440" tIns="45720" rIns="91440" bIns="45720" rtlCol="0" anchor="ctr">
-            <a:normAutofit/>
-          </a:bodyPr>
-          <a:lstStyle>
-            <a:lvl1pPr algn="l" defTabSz="914400" rtl="0" eaLnBrk="1" latinLnBrk="0" hangingPunct="1">
-              <a:lnSpc>
-                <a:spcPct val="100000"/>
-              </a:lnSpc>
-              <a:spcBef>
-                <a:spcPct val="0"/>
-              </a:spcBef>
-              <a:buNone/>
-              <a:defRPr sz="5400" kern="1200">
-                <a:solidFill>
-                  <a:schemeClr val="tx1"/>
-                </a:solidFill>
-                <a:latin typeface="+mj-lt"/>
-                <a:ea typeface="+mj-ea"/>
-                <a:cs typeface="+mj-cs"/>
-              </a:defRPr>
-            </a:lvl1pPr>
-          </a:lstStyle>
-          <a:p>
-            <a:pPr algn="ctr"/>
-            <a:endParaRPr lang="fr-FR" sz="2800" dirty="0"/>
-          </a:p>
-        </p:txBody>
-      </p:sp>
-      <p:sp>
-        <p:nvSpPr>
-          <p:cNvPr id="13" name="Titre 1">
-            <a:extLst>
-              <a:ext uri="{FF2B5EF4-FFF2-40B4-BE49-F238E27FC236}">
-                <a16:creationId xmlns:a16="http://schemas.microsoft.com/office/drawing/2014/main" id="{EB9F3328-2FC3-4805-903B-30D6848DBE17}"/>
-              </a:ext>
-            </a:extLst>
-          </p:cNvPr>
-          <p:cNvSpPr txBox="1">
-            <a:spLocks/>
-          </p:cNvSpPr>
-          <p:nvPr/>
-        </p:nvSpPr>
-        <p:spPr>
-          <a:xfrm>
-            <a:off x="4085730" y="4488696"/>
-            <a:ext cx="3878179" cy="1325563"/>
-          </a:xfrm>
-          <a:prstGeom prst="rect">
-            <a:avLst/>
-          </a:prstGeom>
-        </p:spPr>
-        <p:txBody>
-          <a:bodyPr vert="horz" lIns="91440" tIns="45720" rIns="91440" bIns="45720" rtlCol="0" anchor="ctr">
-            <a:normAutofit/>
-          </a:bodyPr>
-          <a:lstStyle>
-            <a:lvl1pPr algn="l" defTabSz="914400" rtl="0" eaLnBrk="1" latinLnBrk="0" hangingPunct="1">
-              <a:lnSpc>
-                <a:spcPct val="100000"/>
-              </a:lnSpc>
-              <a:spcBef>
-                <a:spcPct val="0"/>
-              </a:spcBef>
-              <a:buNone/>
-              <a:defRPr sz="5400" kern="1200">
-                <a:solidFill>
-                  <a:schemeClr val="tx1"/>
-                </a:solidFill>
-                <a:latin typeface="+mj-lt"/>
-                <a:ea typeface="+mj-ea"/>
-                <a:cs typeface="+mj-cs"/>
-              </a:defRPr>
-            </a:lvl1pPr>
-          </a:lstStyle>
-          <a:p>
-            <a:pPr algn="ctr"/>
-            <a:endParaRPr lang="fr-FR" sz="2800" dirty="0"/>
-          </a:p>
-        </p:txBody>
-      </p:sp>
-      <p:sp>
-        <p:nvSpPr>
-          <p:cNvPr id="14" name="Titre 1">
-            <a:extLst>
-              <a:ext uri="{FF2B5EF4-FFF2-40B4-BE49-F238E27FC236}">
-                <a16:creationId xmlns:a16="http://schemas.microsoft.com/office/drawing/2014/main" id="{C55C0BEC-B86B-4A64-9C59-95FB01D1A5C7}"/>
-              </a:ext>
-            </a:extLst>
-          </p:cNvPr>
-          <p:cNvSpPr txBox="1">
-            <a:spLocks/>
-          </p:cNvSpPr>
-          <p:nvPr/>
-        </p:nvSpPr>
-        <p:spPr>
-          <a:xfrm>
-            <a:off x="7650409" y="618879"/>
-            <a:ext cx="3878179" cy="1325563"/>
-          </a:xfrm>
-          <a:prstGeom prst="rect">
-            <a:avLst/>
-          </a:prstGeom>
-        </p:spPr>
-        <p:txBody>
-          <a:bodyPr vert="horz" lIns="91440" tIns="45720" rIns="91440" bIns="45720" rtlCol="0" anchor="ctr">
-            <a:normAutofit/>
-          </a:bodyPr>
-          <a:lstStyle>
-            <a:lvl1pPr algn="l" defTabSz="914400" rtl="0" eaLnBrk="1" latinLnBrk="0" hangingPunct="1">
-              <a:lnSpc>
-                <a:spcPct val="100000"/>
-              </a:lnSpc>
-              <a:spcBef>
-                <a:spcPct val="0"/>
-              </a:spcBef>
-              <a:buNone/>
-              <a:defRPr sz="5400" kern="1200">
-                <a:solidFill>
-                  <a:schemeClr val="tx1"/>
-                </a:solidFill>
-                <a:latin typeface="+mj-lt"/>
-                <a:ea typeface="+mj-ea"/>
-                <a:cs typeface="+mj-cs"/>
-              </a:defRPr>
-            </a:lvl1pPr>
-          </a:lstStyle>
-          <a:p>
-            <a:pPr algn="ctr"/>
-            <a:endParaRPr lang="fr-FR" sz="2800" dirty="0"/>
-          </a:p>
-        </p:txBody>
-      </p:sp>
-      <p:pic>
-        <p:nvPicPr>
-          <p:cNvPr id="20" name="Image 19" descr="Une image contenant texte, intérieur, équipement électronique&#10;&#10;Description générée automatiquement">
-            <a:extLst>
-              <a:ext uri="{FF2B5EF4-FFF2-40B4-BE49-F238E27FC236}">
-                <a16:creationId xmlns:a16="http://schemas.microsoft.com/office/drawing/2014/main" id="{1A278367-495D-4ED5-A969-0CCE79C20D4B}"/>
-              </a:ext>
-            </a:extLst>
-          </p:cNvPr>
-          <p:cNvPicPr>
-            <a:picLocks noChangeAspect="1"/>
-          </p:cNvPicPr>
-          <p:nvPr/>
-        </p:nvPicPr>
-        <p:blipFill>
-          <a:blip r:embed="rId2">
-            <a:extLst>
-              <a:ext uri="{28A0092B-C50C-407E-A947-70E740481C1C}">
-                <a14:useLocalDpi xmlns:a14="http://schemas.microsoft.com/office/drawing/2010/main" val="0"/>
-              </a:ext>
-            </a:extLst>
-          </a:blip>
-          <a:stretch>
-            <a:fillRect/>
-          </a:stretch>
-        </p:blipFill>
-        <p:spPr>
-          <a:xfrm>
-            <a:off x="3991550" y="106591"/>
-            <a:ext cx="3288912" cy="2466685"/>
-          </a:xfrm>
-          <a:prstGeom prst="rect">
-            <a:avLst/>
-          </a:prstGeom>
-        </p:spPr>
-      </p:pic>
-      <p:pic>
-        <p:nvPicPr>
-          <p:cNvPr id="22" name="Image 21">
-            <a:extLst>
-              <a:ext uri="{FF2B5EF4-FFF2-40B4-BE49-F238E27FC236}">
-                <a16:creationId xmlns:a16="http://schemas.microsoft.com/office/drawing/2014/main" id="{75090298-5A6F-4704-A6DA-4635D84D9387}"/>
-              </a:ext>
-            </a:extLst>
-          </p:cNvPr>
-          <p:cNvPicPr>
-            <a:picLocks noChangeAspect="1"/>
-          </p:cNvPicPr>
-          <p:nvPr/>
-        </p:nvPicPr>
-        <p:blipFill>
-          <a:blip r:embed="rId3">
-            <a:extLst>
-              <a:ext uri="{28A0092B-C50C-407E-A947-70E740481C1C}">
-                <a14:useLocalDpi xmlns:a14="http://schemas.microsoft.com/office/drawing/2010/main" val="0"/>
-              </a:ext>
-            </a:extLst>
-          </a:blip>
-          <a:stretch>
-            <a:fillRect/>
-          </a:stretch>
-        </p:blipFill>
-        <p:spPr>
-          <a:xfrm>
-            <a:off x="8125911" y="93025"/>
-            <a:ext cx="3288913" cy="2466685"/>
-          </a:xfrm>
-          <a:prstGeom prst="rect">
-            <a:avLst/>
-          </a:prstGeom>
-        </p:spPr>
-      </p:pic>
-      <p:pic>
-        <p:nvPicPr>
-          <p:cNvPr id="24" name="Image 23" descr="Une image contenant texte&#10;&#10;Description générée automatiquement">
-            <a:extLst>
-              <a:ext uri="{FF2B5EF4-FFF2-40B4-BE49-F238E27FC236}">
-                <a16:creationId xmlns:a16="http://schemas.microsoft.com/office/drawing/2014/main" id="{E593C017-9322-4930-A645-26B52C9A038B}"/>
-              </a:ext>
-            </a:extLst>
-          </p:cNvPr>
-          <p:cNvPicPr>
-            <a:picLocks noChangeAspect="1"/>
-          </p:cNvPicPr>
-          <p:nvPr/>
-        </p:nvPicPr>
-        <p:blipFill>
-          <a:blip r:embed="rId4">
-            <a:extLst>
-              <a:ext uri="{28A0092B-C50C-407E-A947-70E740481C1C}">
-                <a14:useLocalDpi xmlns:a14="http://schemas.microsoft.com/office/drawing/2010/main" val="0"/>
-              </a:ext>
-            </a:extLst>
-          </a:blip>
-          <a:stretch>
-            <a:fillRect/>
-          </a:stretch>
-        </p:blipFill>
-        <p:spPr>
-          <a:xfrm>
-            <a:off x="3857264" y="2630076"/>
-            <a:ext cx="3612920" cy="2032267"/>
-          </a:xfrm>
-          <a:prstGeom prst="rect">
-            <a:avLst/>
-          </a:prstGeom>
-        </p:spPr>
-      </p:pic>
-      <p:pic>
-        <p:nvPicPr>
-          <p:cNvPr id="26" name="Image 25" descr="Une image contenant sport, nageant&#10;&#10;Description générée automatiquement">
-            <a:extLst>
-              <a:ext uri="{FF2B5EF4-FFF2-40B4-BE49-F238E27FC236}">
-                <a16:creationId xmlns:a16="http://schemas.microsoft.com/office/drawing/2014/main" id="{A3CCB1DC-79A5-48FF-9D77-FCC18008E03C}"/>
-              </a:ext>
-            </a:extLst>
-          </p:cNvPr>
-          <p:cNvPicPr>
-            <a:picLocks noChangeAspect="1"/>
-          </p:cNvPicPr>
-          <p:nvPr/>
-        </p:nvPicPr>
-        <p:blipFill>
-          <a:blip r:embed="rId5">
-            <a:extLst>
-              <a:ext uri="{28A0092B-C50C-407E-A947-70E740481C1C}">
-                <a14:useLocalDpi xmlns:a14="http://schemas.microsoft.com/office/drawing/2010/main" val="0"/>
-              </a:ext>
-            </a:extLst>
-          </a:blip>
-          <a:stretch>
-            <a:fillRect/>
-          </a:stretch>
-        </p:blipFill>
-        <p:spPr>
-          <a:xfrm>
-            <a:off x="7963909" y="2630076"/>
-            <a:ext cx="3612920" cy="2032268"/>
-          </a:xfrm>
-          <a:prstGeom prst="rect">
-            <a:avLst/>
-          </a:prstGeom>
-        </p:spPr>
-      </p:pic>
-      <p:pic>
-        <p:nvPicPr>
-          <p:cNvPr id="28" name="Image 27">
-            <a:extLst>
-              <a:ext uri="{FF2B5EF4-FFF2-40B4-BE49-F238E27FC236}">
-                <a16:creationId xmlns:a16="http://schemas.microsoft.com/office/drawing/2014/main" id="{3A137909-3166-41A5-B8F6-12B78BF0A6A7}"/>
-              </a:ext>
-            </a:extLst>
-          </p:cNvPr>
-          <p:cNvPicPr>
-            <a:picLocks noChangeAspect="1"/>
-          </p:cNvPicPr>
-          <p:nvPr/>
-        </p:nvPicPr>
-        <p:blipFill>
-          <a:blip r:embed="rId6">
-            <a:extLst>
-              <a:ext uri="{28A0092B-C50C-407E-A947-70E740481C1C}">
-                <a14:useLocalDpi xmlns:a14="http://schemas.microsoft.com/office/drawing/2010/main" val="0"/>
-              </a:ext>
-            </a:extLst>
-          </a:blip>
-          <a:stretch>
-            <a:fillRect/>
-          </a:stretch>
-        </p:blipFill>
-        <p:spPr>
-          <a:xfrm>
-            <a:off x="7988029" y="4732710"/>
-            <a:ext cx="3564679" cy="2005132"/>
-          </a:xfrm>
-          <a:prstGeom prst="rect">
-            <a:avLst/>
-          </a:prstGeom>
-        </p:spPr>
-      </p:pic>
-      <p:pic>
-        <p:nvPicPr>
-          <p:cNvPr id="30" name="Image 29">
-            <a:extLst>
-              <a:ext uri="{FF2B5EF4-FFF2-40B4-BE49-F238E27FC236}">
-                <a16:creationId xmlns:a16="http://schemas.microsoft.com/office/drawing/2014/main" id="{422ED870-D798-45BB-85FE-B9CBDD9ACE7D}"/>
-              </a:ext>
-            </a:extLst>
-          </p:cNvPr>
-          <p:cNvPicPr>
-            <a:picLocks noChangeAspect="1"/>
-          </p:cNvPicPr>
-          <p:nvPr/>
-        </p:nvPicPr>
-        <p:blipFill>
-          <a:blip r:embed="rId7">
-            <a:extLst>
-              <a:ext uri="{28A0092B-C50C-407E-A947-70E740481C1C}">
-                <a14:useLocalDpi xmlns:a14="http://schemas.microsoft.com/office/drawing/2010/main" val="0"/>
-              </a:ext>
-            </a:extLst>
-          </a:blip>
-          <a:stretch>
-            <a:fillRect/>
-          </a:stretch>
-        </p:blipFill>
-        <p:spPr>
-          <a:xfrm>
-            <a:off x="3855482" y="4719143"/>
-            <a:ext cx="3614702" cy="2032266"/>
-          </a:xfrm>
-          <a:prstGeom prst="rect">
-            <a:avLst/>
-          </a:prstGeom>
-        </p:spPr>
-      </p:pic>
-    </p:spTree>
-    <p:extLst>
-      <p:ext uri="{BB962C8B-B14F-4D97-AF65-F5344CB8AC3E}">
-        <p14:creationId xmlns:p14="http://schemas.microsoft.com/office/powerpoint/2010/main" val="2721008647"/>
-      </p:ext>
-    </p:extLst>
-  </p:cSld>
-  <p:clrMapOvr>
-    <a:masterClrMapping/>
-  </p:clrMapOvr>
-</p:sld>
-</file>
-
 <file path=ppt/slides/slide4.xml><?xml version="1.0" encoding="utf-8"?>
 <p:sld xmlns:a="http://schemas.openxmlformats.org/drawingml/2006/main" xmlns:r="http://schemas.openxmlformats.org/officeDocument/2006/relationships" xmlns:p="http://schemas.openxmlformats.org/presentationml/2006/main">
   <p:cSld>
@@ -16521,7 +16951,7 @@
             <p:ph idx="1"/>
             <p:extLst>
               <p:ext uri="{D42A27DB-BD31-4B8C-83A1-F6EECF244321}">
-                <p14:modId xmlns:p14="http://schemas.microsoft.com/office/powerpoint/2010/main" val="22565241"/>
+                <p14:modId xmlns:p14="http://schemas.microsoft.com/office/powerpoint/2010/main" val="1974056915"/>
               </p:ext>
             </p:extLst>
           </p:nvPr>

</xml_diff>

<commit_message>
##[0.1.1.1] - 2021-06-06 ### Ajout -Quasi finalisation du mémoire et ajout de commentaires dans le code.
</commit_message>
<xml_diff>
--- a/Présentation/Projet Astral.pptx
+++ b/Présentation/Projet Astral.pptx
@@ -3763,7 +3763,7 @@
           <a:p>
             <a:fld id="{72345051-2045-45DA-935E-2E3CA1A69ADC}" type="datetimeFigureOut">
               <a:rPr lang="en-US" smtClean="0"/>
-              <a:t>5/11/2021</a:t>
+              <a:t>5/17/2021</a:t>
             </a:fld>
             <a:endParaRPr lang="en-US" dirty="0"/>
           </a:p>
@@ -3961,7 +3961,7 @@
           <a:p>
             <a:fld id="{72345051-2045-45DA-935E-2E3CA1A69ADC}" type="datetimeFigureOut">
               <a:rPr lang="en-US" smtClean="0"/>
-              <a:t>5/11/2021</a:t>
+              <a:t>5/17/2021</a:t>
             </a:fld>
             <a:endParaRPr lang="en-US"/>
           </a:p>
@@ -4169,7 +4169,7 @@
           <a:p>
             <a:fld id="{72345051-2045-45DA-935E-2E3CA1A69ADC}" type="datetimeFigureOut">
               <a:rPr lang="en-US" smtClean="0"/>
-              <a:t>5/11/2021</a:t>
+              <a:t>5/17/2021</a:t>
             </a:fld>
             <a:endParaRPr lang="en-US"/>
           </a:p>
@@ -4391,7 +4391,7 @@
           <a:p>
             <a:fld id="{72345051-2045-45DA-935E-2E3CA1A69ADC}" type="datetimeFigureOut">
               <a:rPr lang="en-US" smtClean="0"/>
-              <a:t>5/11/2021</a:t>
+              <a:t>5/17/2021</a:t>
             </a:fld>
             <a:endParaRPr lang="en-US"/>
           </a:p>
@@ -5302,7 +5302,7 @@
           <a:p>
             <a:fld id="{72345051-2045-45DA-935E-2E3CA1A69ADC}" type="datetimeFigureOut">
               <a:rPr lang="en-US" smtClean="0"/>
-              <a:t>5/11/2021</a:t>
+              <a:t>5/17/2021</a:t>
             </a:fld>
             <a:endParaRPr lang="en-US"/>
           </a:p>
@@ -5905,7 +5905,7 @@
           <a:p>
             <a:fld id="{72345051-2045-45DA-935E-2E3CA1A69ADC}" type="datetimeFigureOut">
               <a:rPr lang="en-US" smtClean="0"/>
-              <a:t>5/11/2021</a:t>
+              <a:t>5/17/2021</a:t>
             </a:fld>
             <a:endParaRPr lang="en-US"/>
           </a:p>
@@ -6953,7 +6953,7 @@
           <a:p>
             <a:fld id="{72345051-2045-45DA-935E-2E3CA1A69ADC}" type="datetimeFigureOut">
               <a:rPr lang="en-US" smtClean="0"/>
-              <a:t>5/11/2021</a:t>
+              <a:t>5/17/2021</a:t>
             </a:fld>
             <a:endParaRPr lang="en-US"/>
           </a:p>
@@ -7737,7 +7737,7 @@
           <a:p>
             <a:fld id="{72345051-2045-45DA-935E-2E3CA1A69ADC}" type="datetimeFigureOut">
               <a:rPr lang="en-US" smtClean="0"/>
-              <a:t>5/11/2021</a:t>
+              <a:t>5/17/2021</a:t>
             </a:fld>
             <a:endParaRPr lang="en-US"/>
           </a:p>
@@ -8186,7 +8186,7 @@
           <a:p>
             <a:fld id="{72345051-2045-45DA-935E-2E3CA1A69ADC}" type="datetimeFigureOut">
               <a:rPr lang="en-US" smtClean="0"/>
-              <a:t>5/11/2021</a:t>
+              <a:t>5/17/2021</a:t>
             </a:fld>
             <a:endParaRPr lang="en-US"/>
           </a:p>
@@ -8503,7 +8503,7 @@
           <a:p>
             <a:fld id="{72345051-2045-45DA-935E-2E3CA1A69ADC}" type="datetimeFigureOut">
               <a:rPr lang="en-US" smtClean="0"/>
-              <a:t>5/11/2021</a:t>
+              <a:t>5/17/2021</a:t>
             </a:fld>
             <a:endParaRPr lang="en-US"/>
           </a:p>
@@ -9131,7 +9131,7 @@
           <a:p>
             <a:fld id="{72345051-2045-45DA-935E-2E3CA1A69ADC}" type="datetimeFigureOut">
               <a:rPr lang="en-US" smtClean="0"/>
-              <a:t>5/11/2021</a:t>
+              <a:t>5/17/2021</a:t>
             </a:fld>
             <a:endParaRPr lang="en-US"/>
           </a:p>
@@ -9704,7 +9704,7 @@
           <a:p>
             <a:fld id="{72345051-2045-45DA-935E-2E3CA1A69ADC}" type="datetimeFigureOut">
               <a:rPr lang="en-US" smtClean="0"/>
-              <a:t>5/11/2021</a:t>
+              <a:t>5/17/2021</a:t>
             </a:fld>
             <a:endParaRPr lang="en-US" dirty="0"/>
           </a:p>
@@ -13840,8 +13840,9 @@
             <a:pPr algn="ctr"/>
             <a:r>
               <a:rPr lang="en-US" sz="9600"/>
-              <a:t>Place au jeu !</a:t>
+              <a:t>Conclusion</a:t>
             </a:r>
+            <a:endParaRPr lang="en-US" sz="9600" dirty="0"/>
           </a:p>
         </p:txBody>
       </p:sp>
@@ -15451,8 +15452,8 @@
         </p:nvSpPr>
         <p:spPr>
           <a:xfrm>
-            <a:off x="1522476" y="1433259"/>
-            <a:ext cx="9144000" cy="3063240"/>
+            <a:off x="1522476" y="2430562"/>
+            <a:ext cx="9144000" cy="1584513"/>
           </a:xfrm>
         </p:spPr>
         <p:txBody>
@@ -15468,15 +15469,15 @@
             </a:pPr>
             <a:r>
               <a:rPr lang="fr-FR" sz="5300" dirty="0"/>
-              <a:t>Le genre </a:t>
+              <a:t>Comment remettre au goût du jour le genre </a:t>
             </a:r>
             <a:r>
               <a:rPr lang="fr-FR" sz="5300" dirty="0" err="1"/>
-              <a:t>Manic</a:t>
+              <a:t>manic</a:t>
             </a:r>
             <a:r>
               <a:rPr lang="fr-FR" sz="5300" dirty="0"/>
-              <a:t> Shooter est très peu présent sur le marché international malgré la présence de ses codes dans plusieurs jeux actuels</a:t>
+              <a:t> shooter vieillissant ?</a:t>
             </a:r>
           </a:p>
         </p:txBody>

</xml_diff>